<commit_message>
Small additions to slides
</commit_message>
<xml_diff>
--- a/slides/11_DimensionalityReduction_Part1.pptx
+++ b/slides/11_DimensionalityReduction_Part1.pptx
@@ -238,7 +238,7 @@
           <a:p>
             <a:fld id="{ED460DB7-3564-4028-881B-4A225B453265}" type="datetimeFigureOut">
               <a:rPr lang="en-US" smtClean="0"/>
-              <a:t>7/23/2024</a:t>
+              <a:t>7/27/2024</a:t>
             </a:fld>
             <a:endParaRPr lang="en-US"/>
           </a:p>
@@ -3117,7 +3117,7 @@
           <a:p>
             <a:fld id="{C62B3463-61C8-4819-BC9A-C94FD847F060}" type="datetimeFigureOut">
               <a:rPr lang="en-US" smtClean="0"/>
-              <a:t>7/23/2024</a:t>
+              <a:t>7/27/2024</a:t>
             </a:fld>
             <a:endParaRPr lang="en-US"/>
           </a:p>
@@ -3315,7 +3315,7 @@
           <a:p>
             <a:fld id="{C62B3463-61C8-4819-BC9A-C94FD847F060}" type="datetimeFigureOut">
               <a:rPr lang="en-US" smtClean="0"/>
-              <a:t>7/23/2024</a:t>
+              <a:t>7/27/2024</a:t>
             </a:fld>
             <a:endParaRPr lang="en-US"/>
           </a:p>
@@ -3523,7 +3523,7 @@
           <a:p>
             <a:fld id="{C62B3463-61C8-4819-BC9A-C94FD847F060}" type="datetimeFigureOut">
               <a:rPr lang="en-US" smtClean="0"/>
-              <a:t>7/23/2024</a:t>
+              <a:t>7/27/2024</a:t>
             </a:fld>
             <a:endParaRPr lang="en-US"/>
           </a:p>
@@ -4286,7 +4286,7 @@
           <a:p>
             <a:fld id="{4ACD6B4E-9726-48B7-95FC-86DC5068328F}" type="datetimeFigureOut">
               <a:rPr lang="en-US" smtClean="0"/>
-              <a:t>7/23/2024</a:t>
+              <a:t>7/27/2024</a:t>
             </a:fld>
             <a:endParaRPr lang="en-US"/>
           </a:p>
@@ -4484,7 +4484,7 @@
           <a:p>
             <a:fld id="{C62B3463-61C8-4819-BC9A-C94FD847F060}" type="datetimeFigureOut">
               <a:rPr lang="en-US" smtClean="0"/>
-              <a:t>7/23/2024</a:t>
+              <a:t>7/27/2024</a:t>
             </a:fld>
             <a:endParaRPr lang="en-US"/>
           </a:p>
@@ -4759,7 +4759,7 @@
           <a:p>
             <a:fld id="{C62B3463-61C8-4819-BC9A-C94FD847F060}" type="datetimeFigureOut">
               <a:rPr lang="en-US" smtClean="0"/>
-              <a:t>7/23/2024</a:t>
+              <a:t>7/27/2024</a:t>
             </a:fld>
             <a:endParaRPr lang="en-US"/>
           </a:p>
@@ -5024,7 +5024,7 @@
           <a:p>
             <a:fld id="{C62B3463-61C8-4819-BC9A-C94FD847F060}" type="datetimeFigureOut">
               <a:rPr lang="en-US" smtClean="0"/>
-              <a:t>7/23/2024</a:t>
+              <a:t>7/27/2024</a:t>
             </a:fld>
             <a:endParaRPr lang="en-US"/>
           </a:p>
@@ -5436,7 +5436,7 @@
           <a:p>
             <a:fld id="{C62B3463-61C8-4819-BC9A-C94FD847F060}" type="datetimeFigureOut">
               <a:rPr lang="en-US" smtClean="0"/>
-              <a:t>7/23/2024</a:t>
+              <a:t>7/27/2024</a:t>
             </a:fld>
             <a:endParaRPr lang="en-US"/>
           </a:p>
@@ -5577,7 +5577,7 @@
           <a:p>
             <a:fld id="{C62B3463-61C8-4819-BC9A-C94FD847F060}" type="datetimeFigureOut">
               <a:rPr lang="en-US" smtClean="0"/>
-              <a:t>7/23/2024</a:t>
+              <a:t>7/27/2024</a:t>
             </a:fld>
             <a:endParaRPr lang="en-US"/>
           </a:p>
@@ -5690,7 +5690,7 @@
           <a:p>
             <a:fld id="{C62B3463-61C8-4819-BC9A-C94FD847F060}" type="datetimeFigureOut">
               <a:rPr lang="en-US" smtClean="0"/>
-              <a:t>7/23/2024</a:t>
+              <a:t>7/27/2024</a:t>
             </a:fld>
             <a:endParaRPr lang="en-US"/>
           </a:p>
@@ -6001,7 +6001,7 @@
           <a:p>
             <a:fld id="{C62B3463-61C8-4819-BC9A-C94FD847F060}" type="datetimeFigureOut">
               <a:rPr lang="en-US" smtClean="0"/>
-              <a:t>7/23/2024</a:t>
+              <a:t>7/27/2024</a:t>
             </a:fld>
             <a:endParaRPr lang="en-US"/>
           </a:p>
@@ -6289,7 +6289,7 @@
           <a:p>
             <a:fld id="{C62B3463-61C8-4819-BC9A-C94FD847F060}" type="datetimeFigureOut">
               <a:rPr lang="en-US" smtClean="0"/>
-              <a:t>7/23/2024</a:t>
+              <a:t>7/27/2024</a:t>
             </a:fld>
             <a:endParaRPr lang="en-US"/>
           </a:p>
@@ -6530,7 +6530,7 @@
           <a:p>
             <a:fld id="{C62B3463-61C8-4819-BC9A-C94FD847F060}" type="datetimeFigureOut">
               <a:rPr lang="en-US" smtClean="0"/>
-              <a:t>7/23/2024</a:t>
+              <a:t>7/27/2024</a:t>
             </a:fld>
             <a:endParaRPr lang="en-US"/>
           </a:p>
@@ -7784,8 +7784,17 @@
               <a:rPr lang="en-US" dirty="0">
                 <a:latin typeface="+mn-lt"/>
               </a:rPr>
-              <a:t>Linear dependency </a:t>
+              <a:t>Linear dependency, e.g. </a:t>
             </a:r>
+            <a:r>
+              <a:rPr lang="en-US">
+                <a:latin typeface="+mn-lt"/>
+              </a:rPr>
+              <a:t>correlation  </a:t>
+            </a:r>
+            <a:endParaRPr lang="en-US" dirty="0">
+              <a:latin typeface="+mn-lt"/>
+            </a:endParaRPr>
           </a:p>
           <a:p>
             <a:pPr lvl="1"/>
@@ -8651,8 +8660,8 @@
           </a:p>
         </p:txBody>
       </p:sp>
-      <mc:AlternateContent xmlns:mc="http://schemas.openxmlformats.org/markup-compatibility/2006">
-        <mc:Choice xmlns:a14="http://schemas.microsoft.com/office/drawing/2010/main" Requires="a14">
+      <mc:AlternateContent xmlns:mc="http://schemas.openxmlformats.org/markup-compatibility/2006" xmlns:a14="http://schemas.microsoft.com/office/drawing/2010/main">
+        <mc:Choice Requires="a14">
           <p:sp>
             <p:nvSpPr>
               <p:cNvPr id="3" name="Content Placeholder 2"/>
@@ -8842,7 +8851,7 @@
             </p:txBody>
           </p:sp>
         </mc:Choice>
-        <mc:Fallback>
+        <mc:Fallback xmlns="">
           <p:sp>
             <p:nvSpPr>
               <p:cNvPr id="3" name="Content Placeholder 2"/>
@@ -13092,8 +13101,8 @@
           </a:p>
         </p:txBody>
       </p:sp>
-      <mc:AlternateContent xmlns:mc="http://schemas.openxmlformats.org/markup-compatibility/2006">
-        <mc:Choice xmlns:a14="http://schemas.microsoft.com/office/drawing/2010/main" Requires="a14">
+      <mc:AlternateContent xmlns:mc="http://schemas.openxmlformats.org/markup-compatibility/2006" xmlns:a14="http://schemas.microsoft.com/office/drawing/2010/main">
+        <mc:Choice Requires="a14">
           <p:sp>
             <p:nvSpPr>
               <p:cNvPr id="3" name="Content Placeholder 2">
@@ -13654,7 +13663,7 @@
             </p:txBody>
           </p:sp>
         </mc:Choice>
-        <mc:Fallback>
+        <mc:Fallback xmlns="">
           <p:sp>
             <p:nvSpPr>
               <p:cNvPr id="3" name="Content Placeholder 2">
@@ -32445,8 +32454,8 @@
           </a:p>
         </p:txBody>
       </p:sp>
-      <mc:AlternateContent xmlns:mc="http://schemas.openxmlformats.org/markup-compatibility/2006" xmlns:a14="http://schemas.microsoft.com/office/drawing/2010/main">
-        <mc:Choice Requires="a14">
+      <mc:AlternateContent xmlns:mc="http://schemas.openxmlformats.org/markup-compatibility/2006">
+        <mc:Choice xmlns:a14="http://schemas.microsoft.com/office/drawing/2010/main" Requires="a14">
           <p:sp>
             <p:nvSpPr>
               <p:cNvPr id="3" name="Content Placeholder 2"/>
@@ -32497,7 +32506,7 @@
                   <a:rPr lang="en-US" dirty="0">
                     <a:latin typeface="+mn-lt"/>
                   </a:rPr>
-                  <a:t>, consider the expected value of a vector in high-dimensional space, </a:t>
+                  <a:t>, consider the expected value of a zero-centered vector in high-dimensional space, </a:t>
                 </a:r>
                 <a14:m>
                   <m:oMath xmlns:m="http://schemas.openxmlformats.org/officeDocument/2006/math">
@@ -33028,7 +33037,7 @@
             </p:txBody>
           </p:sp>
         </mc:Choice>
-        <mc:Fallback xmlns="">
+        <mc:Fallback>
           <p:sp>
             <p:nvSpPr>
               <p:cNvPr id="3" name="Content Placeholder 2"/>

</xml_diff>

<commit_message>
Corrections and small improvements to dimensionality reduction slides
</commit_message>
<xml_diff>
--- a/slides/11_DimensionalityReduction_Part1.pptx
+++ b/slides/11_DimensionalityReduction_Part1.pptx
@@ -238,7 +238,7 @@
           <a:p>
             <a:fld id="{ED460DB7-3564-4028-881B-4A225B453265}" type="datetimeFigureOut">
               <a:rPr lang="en-US" smtClean="0"/>
-              <a:t>7/27/2024</a:t>
+              <a:t>7/29/2024</a:t>
             </a:fld>
             <a:endParaRPr lang="en-US"/>
           </a:p>
@@ -3117,7 +3117,7 @@
           <a:p>
             <a:fld id="{C62B3463-61C8-4819-BC9A-C94FD847F060}" type="datetimeFigureOut">
               <a:rPr lang="en-US" smtClean="0"/>
-              <a:t>7/27/2024</a:t>
+              <a:t>7/29/2024</a:t>
             </a:fld>
             <a:endParaRPr lang="en-US"/>
           </a:p>
@@ -3315,7 +3315,7 @@
           <a:p>
             <a:fld id="{C62B3463-61C8-4819-BC9A-C94FD847F060}" type="datetimeFigureOut">
               <a:rPr lang="en-US" smtClean="0"/>
-              <a:t>7/27/2024</a:t>
+              <a:t>7/29/2024</a:t>
             </a:fld>
             <a:endParaRPr lang="en-US"/>
           </a:p>
@@ -3523,7 +3523,7 @@
           <a:p>
             <a:fld id="{C62B3463-61C8-4819-BC9A-C94FD847F060}" type="datetimeFigureOut">
               <a:rPr lang="en-US" smtClean="0"/>
-              <a:t>7/27/2024</a:t>
+              <a:t>7/29/2024</a:t>
             </a:fld>
             <a:endParaRPr lang="en-US"/>
           </a:p>
@@ -4286,7 +4286,7 @@
           <a:p>
             <a:fld id="{4ACD6B4E-9726-48B7-95FC-86DC5068328F}" type="datetimeFigureOut">
               <a:rPr lang="en-US" smtClean="0"/>
-              <a:t>7/27/2024</a:t>
+              <a:t>7/29/2024</a:t>
             </a:fld>
             <a:endParaRPr lang="en-US"/>
           </a:p>
@@ -4484,7 +4484,7 @@
           <a:p>
             <a:fld id="{C62B3463-61C8-4819-BC9A-C94FD847F060}" type="datetimeFigureOut">
               <a:rPr lang="en-US" smtClean="0"/>
-              <a:t>7/27/2024</a:t>
+              <a:t>7/29/2024</a:t>
             </a:fld>
             <a:endParaRPr lang="en-US"/>
           </a:p>
@@ -4759,7 +4759,7 @@
           <a:p>
             <a:fld id="{C62B3463-61C8-4819-BC9A-C94FD847F060}" type="datetimeFigureOut">
               <a:rPr lang="en-US" smtClean="0"/>
-              <a:t>7/27/2024</a:t>
+              <a:t>7/29/2024</a:t>
             </a:fld>
             <a:endParaRPr lang="en-US"/>
           </a:p>
@@ -5024,7 +5024,7 @@
           <a:p>
             <a:fld id="{C62B3463-61C8-4819-BC9A-C94FD847F060}" type="datetimeFigureOut">
               <a:rPr lang="en-US" smtClean="0"/>
-              <a:t>7/27/2024</a:t>
+              <a:t>7/29/2024</a:t>
             </a:fld>
             <a:endParaRPr lang="en-US"/>
           </a:p>
@@ -5436,7 +5436,7 @@
           <a:p>
             <a:fld id="{C62B3463-61C8-4819-BC9A-C94FD847F060}" type="datetimeFigureOut">
               <a:rPr lang="en-US" smtClean="0"/>
-              <a:t>7/27/2024</a:t>
+              <a:t>7/29/2024</a:t>
             </a:fld>
             <a:endParaRPr lang="en-US"/>
           </a:p>
@@ -5577,7 +5577,7 @@
           <a:p>
             <a:fld id="{C62B3463-61C8-4819-BC9A-C94FD847F060}" type="datetimeFigureOut">
               <a:rPr lang="en-US" smtClean="0"/>
-              <a:t>7/27/2024</a:t>
+              <a:t>7/29/2024</a:t>
             </a:fld>
             <a:endParaRPr lang="en-US"/>
           </a:p>
@@ -5690,7 +5690,7 @@
           <a:p>
             <a:fld id="{C62B3463-61C8-4819-BC9A-C94FD847F060}" type="datetimeFigureOut">
               <a:rPr lang="en-US" smtClean="0"/>
-              <a:t>7/27/2024</a:t>
+              <a:t>7/29/2024</a:t>
             </a:fld>
             <a:endParaRPr lang="en-US"/>
           </a:p>
@@ -6001,7 +6001,7 @@
           <a:p>
             <a:fld id="{C62B3463-61C8-4819-BC9A-C94FD847F060}" type="datetimeFigureOut">
               <a:rPr lang="en-US" smtClean="0"/>
-              <a:t>7/27/2024</a:t>
+              <a:t>7/29/2024</a:t>
             </a:fld>
             <a:endParaRPr lang="en-US"/>
           </a:p>
@@ -6289,7 +6289,7 @@
           <a:p>
             <a:fld id="{C62B3463-61C8-4819-BC9A-C94FD847F060}" type="datetimeFigureOut">
               <a:rPr lang="en-US" smtClean="0"/>
-              <a:t>7/27/2024</a:t>
+              <a:t>7/29/2024</a:t>
             </a:fld>
             <a:endParaRPr lang="en-US"/>
           </a:p>
@@ -6530,7 +6530,7 @@
           <a:p>
             <a:fld id="{C62B3463-61C8-4819-BC9A-C94FD847F060}" type="datetimeFigureOut">
               <a:rPr lang="en-US" smtClean="0"/>
-              <a:t>7/27/2024</a:t>
+              <a:t>7/29/2024</a:t>
             </a:fld>
             <a:endParaRPr lang="en-US"/>
           </a:p>
@@ -8660,8 +8660,8 @@
           </a:p>
         </p:txBody>
       </p:sp>
-      <mc:AlternateContent xmlns:mc="http://schemas.openxmlformats.org/markup-compatibility/2006" xmlns:a14="http://schemas.microsoft.com/office/drawing/2010/main">
-        <mc:Choice Requires="a14">
+      <mc:AlternateContent xmlns:mc="http://schemas.openxmlformats.org/markup-compatibility/2006">
+        <mc:Choice xmlns:a14="http://schemas.microsoft.com/office/drawing/2010/main" Requires="a14">
           <p:sp>
             <p:nvSpPr>
               <p:cNvPr id="3" name="Content Placeholder 2"/>
@@ -8700,6 +8700,24 @@
                     <a:latin typeface="+mn-lt"/>
                   </a:rPr>
                   <a:t>Principal Component Analysis: PCA, SVD</a:t>
+                </a:r>
+              </a:p>
+              <a:p>
+                <a:pPr lvl="1"/>
+                <a:r>
+                  <a:rPr lang="en-US" dirty="0">
+                    <a:latin typeface="+mn-lt"/>
+                  </a:rPr>
+                  <a:t>Pearson, 1901</a:t>
+                </a:r>
+              </a:p>
+              <a:p>
+                <a:pPr lvl="1"/>
+                <a:r>
+                  <a:rPr lang="en-US" dirty="0">
+                    <a:latin typeface="+mn-lt"/>
+                  </a:rPr>
+                  <a:t>A generative model</a:t>
                 </a:r>
               </a:p>
               <a:p>
@@ -8851,7 +8869,7 @@
             </p:txBody>
           </p:sp>
         </mc:Choice>
-        <mc:Fallback xmlns="">
+        <mc:Fallback>
           <p:sp>
             <p:nvSpPr>
               <p:cNvPr id="3" name="Content Placeholder 2"/>
@@ -8899,6 +8917,356 @@
   <p:clrMapOvr>
     <a:masterClrMapping/>
   </p:clrMapOvr>
+  <p:timing>
+    <p:tnLst>
+      <p:par>
+        <p:cTn id="1" dur="indefinite" restart="never" nodeType="tmRoot">
+          <p:childTnLst>
+            <p:seq concurrent="1" nextAc="seek">
+              <p:cTn id="2" dur="indefinite" nodeType="mainSeq">
+                <p:childTnLst>
+                  <p:par>
+                    <p:cTn id="3" fill="hold">
+                      <p:stCondLst>
+                        <p:cond delay="indefinite"/>
+                      </p:stCondLst>
+                      <p:childTnLst>
+                        <p:par>
+                          <p:cTn id="4" fill="hold">
+                            <p:stCondLst>
+                              <p:cond delay="0"/>
+                            </p:stCondLst>
+                            <p:childTnLst>
+                              <p:par>
+                                <p:cTn id="5" presetID="1" presetClass="entr" presetSubtype="0" fill="hold" nodeType="clickEffect">
+                                  <p:stCondLst>
+                                    <p:cond delay="0"/>
+                                  </p:stCondLst>
+                                  <p:childTnLst>
+                                    <p:set>
+                                      <p:cBhvr>
+                                        <p:cTn id="6" dur="1" fill="hold">
+                                          <p:stCondLst>
+                                            <p:cond delay="0"/>
+                                          </p:stCondLst>
+                                        </p:cTn>
+                                        <p:tgtEl>
+                                          <p:spTgt spid="3">
+                                            <p:txEl>
+                                              <p:pRg st="1" end="1"/>
+                                            </p:txEl>
+                                          </p:spTgt>
+                                        </p:tgtEl>
+                                        <p:attrNameLst>
+                                          <p:attrName>style.visibility</p:attrName>
+                                        </p:attrNameLst>
+                                      </p:cBhvr>
+                                      <p:to>
+                                        <p:strVal val="visible"/>
+                                      </p:to>
+                                    </p:set>
+                                  </p:childTnLst>
+                                </p:cTn>
+                              </p:par>
+                              <p:par>
+                                <p:cTn id="7" presetID="1" presetClass="entr" presetSubtype="0" fill="hold" nodeType="withEffect">
+                                  <p:stCondLst>
+                                    <p:cond delay="0"/>
+                                  </p:stCondLst>
+                                  <p:childTnLst>
+                                    <p:set>
+                                      <p:cBhvr>
+                                        <p:cTn id="8" dur="1" fill="hold">
+                                          <p:stCondLst>
+                                            <p:cond delay="0"/>
+                                          </p:stCondLst>
+                                        </p:cTn>
+                                        <p:tgtEl>
+                                          <p:spTgt spid="3">
+                                            <p:txEl>
+                                              <p:pRg st="2" end="2"/>
+                                            </p:txEl>
+                                          </p:spTgt>
+                                        </p:tgtEl>
+                                        <p:attrNameLst>
+                                          <p:attrName>style.visibility</p:attrName>
+                                        </p:attrNameLst>
+                                      </p:cBhvr>
+                                      <p:to>
+                                        <p:strVal val="visible"/>
+                                      </p:to>
+                                    </p:set>
+                                  </p:childTnLst>
+                                </p:cTn>
+                              </p:par>
+                              <p:par>
+                                <p:cTn id="9" presetID="1" presetClass="entr" presetSubtype="0" fill="hold" nodeType="withEffect">
+                                  <p:stCondLst>
+                                    <p:cond delay="0"/>
+                                  </p:stCondLst>
+                                  <p:childTnLst>
+                                    <p:set>
+                                      <p:cBhvr>
+                                        <p:cTn id="10" dur="1" fill="hold">
+                                          <p:stCondLst>
+                                            <p:cond delay="0"/>
+                                          </p:stCondLst>
+                                        </p:cTn>
+                                        <p:tgtEl>
+                                          <p:spTgt spid="3">
+                                            <p:txEl>
+                                              <p:pRg st="3" end="3"/>
+                                            </p:txEl>
+                                          </p:spTgt>
+                                        </p:tgtEl>
+                                        <p:attrNameLst>
+                                          <p:attrName>style.visibility</p:attrName>
+                                        </p:attrNameLst>
+                                      </p:cBhvr>
+                                      <p:to>
+                                        <p:strVal val="visible"/>
+                                      </p:to>
+                                    </p:set>
+                                  </p:childTnLst>
+                                </p:cTn>
+                              </p:par>
+                            </p:childTnLst>
+                          </p:cTn>
+                        </p:par>
+                      </p:childTnLst>
+                    </p:cTn>
+                  </p:par>
+                  <p:par>
+                    <p:cTn id="11" fill="hold">
+                      <p:stCondLst>
+                        <p:cond delay="indefinite"/>
+                      </p:stCondLst>
+                      <p:childTnLst>
+                        <p:par>
+                          <p:cTn id="12" fill="hold">
+                            <p:stCondLst>
+                              <p:cond delay="0"/>
+                            </p:stCondLst>
+                            <p:childTnLst>
+                              <p:par>
+                                <p:cTn id="13" presetID="1" presetClass="entr" presetSubtype="0" fill="hold" nodeType="clickEffect">
+                                  <p:stCondLst>
+                                    <p:cond delay="0"/>
+                                  </p:stCondLst>
+                                  <p:childTnLst>
+                                    <p:set>
+                                      <p:cBhvr>
+                                        <p:cTn id="14" dur="1" fill="hold">
+                                          <p:stCondLst>
+                                            <p:cond delay="0"/>
+                                          </p:stCondLst>
+                                        </p:cTn>
+                                        <p:tgtEl>
+                                          <p:spTgt spid="3">
+                                            <p:txEl>
+                                              <p:pRg st="4" end="4"/>
+                                            </p:txEl>
+                                          </p:spTgt>
+                                        </p:tgtEl>
+                                        <p:attrNameLst>
+                                          <p:attrName>style.visibility</p:attrName>
+                                        </p:attrNameLst>
+                                      </p:cBhvr>
+                                      <p:to>
+                                        <p:strVal val="visible"/>
+                                      </p:to>
+                                    </p:set>
+                                  </p:childTnLst>
+                                </p:cTn>
+                              </p:par>
+                              <p:par>
+                                <p:cTn id="15" presetID="1" presetClass="entr" presetSubtype="0" fill="hold" nodeType="withEffect">
+                                  <p:stCondLst>
+                                    <p:cond delay="0"/>
+                                  </p:stCondLst>
+                                  <p:childTnLst>
+                                    <p:set>
+                                      <p:cBhvr>
+                                        <p:cTn id="16" dur="1" fill="hold">
+                                          <p:stCondLst>
+                                            <p:cond delay="0"/>
+                                          </p:stCondLst>
+                                        </p:cTn>
+                                        <p:tgtEl>
+                                          <p:spTgt spid="3">
+                                            <p:txEl>
+                                              <p:pRg st="5" end="5"/>
+                                            </p:txEl>
+                                          </p:spTgt>
+                                        </p:tgtEl>
+                                        <p:attrNameLst>
+                                          <p:attrName>style.visibility</p:attrName>
+                                        </p:attrNameLst>
+                                      </p:cBhvr>
+                                      <p:to>
+                                        <p:strVal val="visible"/>
+                                      </p:to>
+                                    </p:set>
+                                  </p:childTnLst>
+                                </p:cTn>
+                              </p:par>
+                            </p:childTnLst>
+                          </p:cTn>
+                        </p:par>
+                      </p:childTnLst>
+                    </p:cTn>
+                  </p:par>
+                  <p:par>
+                    <p:cTn id="17" fill="hold">
+                      <p:stCondLst>
+                        <p:cond delay="indefinite"/>
+                      </p:stCondLst>
+                      <p:childTnLst>
+                        <p:par>
+                          <p:cTn id="18" fill="hold">
+                            <p:stCondLst>
+                              <p:cond delay="0"/>
+                            </p:stCondLst>
+                            <p:childTnLst>
+                              <p:par>
+                                <p:cTn id="19" presetID="1" presetClass="entr" presetSubtype="0" fill="hold" nodeType="clickEffect">
+                                  <p:stCondLst>
+                                    <p:cond delay="0"/>
+                                  </p:stCondLst>
+                                  <p:childTnLst>
+                                    <p:set>
+                                      <p:cBhvr>
+                                        <p:cTn id="20" dur="1" fill="hold">
+                                          <p:stCondLst>
+                                            <p:cond delay="0"/>
+                                          </p:stCondLst>
+                                        </p:cTn>
+                                        <p:tgtEl>
+                                          <p:spTgt spid="3">
+                                            <p:txEl>
+                                              <p:pRg st="6" end="6"/>
+                                            </p:txEl>
+                                          </p:spTgt>
+                                        </p:tgtEl>
+                                        <p:attrNameLst>
+                                          <p:attrName>style.visibility</p:attrName>
+                                        </p:attrNameLst>
+                                      </p:cBhvr>
+                                      <p:to>
+                                        <p:strVal val="visible"/>
+                                      </p:to>
+                                    </p:set>
+                                  </p:childTnLst>
+                                </p:cTn>
+                              </p:par>
+                              <p:par>
+                                <p:cTn id="21" presetID="1" presetClass="entr" presetSubtype="0" fill="hold" nodeType="withEffect">
+                                  <p:stCondLst>
+                                    <p:cond delay="0"/>
+                                  </p:stCondLst>
+                                  <p:childTnLst>
+                                    <p:set>
+                                      <p:cBhvr>
+                                        <p:cTn id="22" dur="1" fill="hold">
+                                          <p:stCondLst>
+                                            <p:cond delay="0"/>
+                                          </p:stCondLst>
+                                        </p:cTn>
+                                        <p:tgtEl>
+                                          <p:spTgt spid="3">
+                                            <p:txEl>
+                                              <p:pRg st="7" end="7"/>
+                                            </p:txEl>
+                                          </p:spTgt>
+                                        </p:tgtEl>
+                                        <p:attrNameLst>
+                                          <p:attrName>style.visibility</p:attrName>
+                                        </p:attrNameLst>
+                                      </p:cBhvr>
+                                      <p:to>
+                                        <p:strVal val="visible"/>
+                                      </p:to>
+                                    </p:set>
+                                  </p:childTnLst>
+                                </p:cTn>
+                              </p:par>
+                            </p:childTnLst>
+                          </p:cTn>
+                        </p:par>
+                      </p:childTnLst>
+                    </p:cTn>
+                  </p:par>
+                  <p:par>
+                    <p:cTn id="23" fill="hold">
+                      <p:stCondLst>
+                        <p:cond delay="indefinite"/>
+                      </p:stCondLst>
+                      <p:childTnLst>
+                        <p:par>
+                          <p:cTn id="24" fill="hold">
+                            <p:stCondLst>
+                              <p:cond delay="0"/>
+                            </p:stCondLst>
+                            <p:childTnLst>
+                              <p:par>
+                                <p:cTn id="25" presetID="1" presetClass="entr" presetSubtype="0" fill="hold" nodeType="clickEffect">
+                                  <p:stCondLst>
+                                    <p:cond delay="0"/>
+                                  </p:stCondLst>
+                                  <p:childTnLst>
+                                    <p:set>
+                                      <p:cBhvr>
+                                        <p:cTn id="26" dur="1" fill="hold">
+                                          <p:stCondLst>
+                                            <p:cond delay="0"/>
+                                          </p:stCondLst>
+                                        </p:cTn>
+                                        <p:tgtEl>
+                                          <p:spTgt spid="3">
+                                            <p:txEl>
+                                              <p:pRg st="8" end="8"/>
+                                            </p:txEl>
+                                          </p:spTgt>
+                                        </p:tgtEl>
+                                        <p:attrNameLst>
+                                          <p:attrName>style.visibility</p:attrName>
+                                        </p:attrNameLst>
+                                      </p:cBhvr>
+                                      <p:to>
+                                        <p:strVal val="visible"/>
+                                      </p:to>
+                                    </p:set>
+                                  </p:childTnLst>
+                                </p:cTn>
+                              </p:par>
+                            </p:childTnLst>
+                          </p:cTn>
+                        </p:par>
+                      </p:childTnLst>
+                    </p:cTn>
+                  </p:par>
+                </p:childTnLst>
+              </p:cTn>
+              <p:prevCondLst>
+                <p:cond evt="onPrev" delay="0">
+                  <p:tgtEl>
+                    <p:sldTgt/>
+                  </p:tgtEl>
+                </p:cond>
+              </p:prevCondLst>
+              <p:nextCondLst>
+                <p:cond evt="onNext" delay="0">
+                  <p:tgtEl>
+                    <p:sldTgt/>
+                  </p:tgtEl>
+                </p:cond>
+              </p:nextCondLst>
+            </p:seq>
+          </p:childTnLst>
+        </p:cTn>
+      </p:par>
+    </p:tnLst>
+  </p:timing>
 </p:sld>
 </file>
 
@@ -9048,7 +9416,32 @@
               <a:rPr lang="en-US" dirty="0">
                 <a:latin typeface="+mn-lt"/>
               </a:rPr>
-              <a:t>Deep autoencoders, other NN-based embedding methods – Beyond the scope of this course   </a:t>
+              <a:t>Deep autoencoders, other NN-based embedding methods</a:t>
+            </a:r>
+          </a:p>
+          <a:p>
+            <a:pPr lvl="1"/>
+            <a:r>
+              <a:rPr lang="en-US" dirty="0">
+                <a:latin typeface="+mn-lt"/>
+              </a:rPr>
+              <a:t>Beyond the scope of this course   </a:t>
+            </a:r>
+          </a:p>
+          <a:p>
+            <a:pPr lvl="1"/>
+            <a:r>
+              <a:rPr lang="en-US" dirty="0">
+                <a:latin typeface="+mn-lt"/>
+              </a:rPr>
+              <a:t>For a well written tutorial on using VAEs as image generative models see </a:t>
+            </a:r>
+            <a:r>
+              <a:rPr lang="en-US" dirty="0">
+                <a:latin typeface="+mn-lt"/>
+                <a:hlinkClick r:id="rId3"/>
+              </a:rPr>
+              <a:t>this post by the amazing Lily Wang of NVIDIA, 2018</a:t>
             </a:r>
             <a:endParaRPr lang="en-US" dirty="0"/>
           </a:p>
@@ -9355,6 +9748,68 @@
                                   </p:childTnLst>
                                 </p:cTn>
                               </p:par>
+                              <p:par>
+                                <p:cTn id="25" presetID="1" presetClass="entr" presetSubtype="0" fill="hold" nodeType="withEffect">
+                                  <p:stCondLst>
+                                    <p:cond delay="0"/>
+                                  </p:stCondLst>
+                                  <p:childTnLst>
+                                    <p:set>
+                                      <p:cBhvr>
+                                        <p:cTn id="26" dur="1" fill="hold">
+                                          <p:stCondLst>
+                                            <p:cond delay="0"/>
+                                          </p:stCondLst>
+                                        </p:cTn>
+                                        <p:tgtEl>
+                                          <p:spTgt spid="3">
+                                            <p:txEl>
+                                              <p:pRg st="8" end="8"/>
+                                            </p:txEl>
+                                          </p:spTgt>
+                                        </p:tgtEl>
+                                        <p:attrNameLst>
+                                          <p:attrName>style.visibility</p:attrName>
+                                        </p:attrNameLst>
+                                      </p:cBhvr>
+                                      <p:to>
+                                        <p:strVal val="visible"/>
+                                      </p:to>
+                                    </p:set>
+                                  </p:childTnLst>
+                                </p:cTn>
+                              </p:par>
+                              <p:par>
+                                <p:cTn id="27" presetID="1" presetClass="entr" presetSubtype="0" fill="hold" nodeType="withEffect">
+                                  <p:stCondLst>
+                                    <p:cond delay="0"/>
+                                  </p:stCondLst>
+                                  <p:childTnLst>
+                                    <p:set>
+                                      <p:cBhvr>
+                                        <p:cTn id="28" dur="1" fill="hold">
+                                          <p:stCondLst>
+                                            <p:cond delay="0"/>
+                                          </p:stCondLst>
+                                        </p:cTn>
+                                        <p:tgtEl>
+                                          <p:spTgt spid="3">
+                                            <p:txEl>
+                                              <p:pRg st="9" end="9"/>
+                                            </p:txEl>
+                                          </p:spTgt>
+                                        </p:tgtEl>
+                                        <p:attrNameLst>
+                                          <p:attrName>style.visibility</p:attrName>
+                                        </p:attrNameLst>
+                                      </p:cBhvr>
+                                      <p:to>
+                                        <p:strVal val="visible"/>
+                                      </p:to>
+                                    </p:set>
+                                  </p:childTnLst>
+                                </p:cTn>
+                              </p:par>
                             </p:childTnLst>
                           </p:cTn>
                         </p:par>
@@ -9535,7 +9990,19 @@
               <a:rPr lang="en-US" dirty="0">
                 <a:latin typeface="+mn-lt"/>
               </a:rPr>
-              <a:t>Start with the original features of the model matrix in the sample space </a:t>
+              <a:t>Start with the original features of the model matrix in the </a:t>
+            </a:r>
+            <a:r>
+              <a:rPr lang="en-US" i="1" dirty="0">
+                <a:latin typeface="+mn-lt"/>
+              </a:rPr>
+              <a:t>p</a:t>
+            </a:r>
+            <a:r>
+              <a:rPr lang="en-US" dirty="0">
+                <a:latin typeface="+mn-lt"/>
+              </a:rPr>
+              <a:t>-dimensional sample space </a:t>
             </a:r>
           </a:p>
           <a:p>
@@ -9589,7 +10056,55 @@
               <a:rPr lang="en-US" dirty="0">
                 <a:latin typeface="+mn-lt"/>
               </a:rPr>
-              <a:t>Transform projects data into an orthogonal space  </a:t>
+              <a:t>Chose first </a:t>
+            </a:r>
+            <a:r>
+              <a:rPr lang="en-US" i="1" dirty="0">
+                <a:latin typeface="+mn-lt"/>
+              </a:rPr>
+              <a:t>l</a:t>
+            </a:r>
+            <a:r>
+              <a:rPr lang="en-US" dirty="0">
+                <a:latin typeface="+mn-lt"/>
+              </a:rPr>
+              <a:t> projection axes </a:t>
+            </a:r>
+          </a:p>
+          <a:p>
+            <a:pPr marL="514350" indent="-514350">
+              <a:buFont typeface="+mj-lt"/>
+              <a:buAutoNum type="arabicPeriod"/>
+            </a:pPr>
+            <a:r>
+              <a:rPr lang="en-US" dirty="0">
+                <a:latin typeface="+mn-lt"/>
+              </a:rPr>
+              <a:t>Transform projects data into an orthogonal space, </a:t>
+            </a:r>
+            <a:r>
+              <a:rPr lang="en-US" i="1" dirty="0">
+                <a:latin typeface="+mn-lt"/>
+              </a:rPr>
+              <a:t>l</a:t>
+            </a:r>
+            <a:r>
+              <a:rPr lang="en-US" dirty="0">
+                <a:latin typeface="+mn-lt"/>
+              </a:rPr>
+              <a:t> &lt; </a:t>
+            </a:r>
+            <a:r>
+              <a:rPr lang="en-US" i="1" dirty="0">
+                <a:latin typeface="+mn-lt"/>
+              </a:rPr>
+              <a:t>p</a:t>
+            </a:r>
+            <a:r>
+              <a:rPr lang="en-US" dirty="0">
+                <a:latin typeface="+mn-lt"/>
+              </a:rPr>
+              <a:t>  </a:t>
             </a:r>
           </a:p>
           <a:p>
@@ -9825,6 +10340,55 @@
                       </p:childTnLst>
                     </p:cTn>
                   </p:par>
+                  <p:par>
+                    <p:cTn id="19" fill="hold">
+                      <p:stCondLst>
+                        <p:cond delay="indefinite"/>
+                      </p:stCondLst>
+                      <p:childTnLst>
+                        <p:par>
+                          <p:cTn id="20" fill="hold">
+                            <p:stCondLst>
+                              <p:cond delay="0"/>
+                            </p:stCondLst>
+                            <p:childTnLst>
+                              <p:par>
+                                <p:cTn id="21" presetID="1" presetClass="entr" presetSubtype="0" fill="hold" nodeType="clickEffect">
+                                  <p:stCondLst>
+                                    <p:cond delay="0"/>
+                                  </p:stCondLst>
+                                  <p:childTnLst>
+                                    <p:set>
+                                      <p:cBhvr>
+                                        <p:cTn id="22" dur="1" fill="hold">
+                                          <p:stCondLst>
+                                            <p:cond delay="0"/>
+                                          </p:stCondLst>
+                                        </p:cTn>
+                                        <p:tgtEl>
+                                          <p:spTgt spid="3">
+                                            <p:txEl>
+                                              <p:pRg st="6" end="6"/>
+                                            </p:txEl>
+                                          </p:spTgt>
+                                        </p:tgtEl>
+                                        <p:attrNameLst>
+                                          <p:attrName>style.visibility</p:attrName>
+                                        </p:attrNameLst>
+                                      </p:cBhvr>
+                                      <p:to>
+                                        <p:strVal val="visible"/>
+                                      </p:to>
+                                    </p:set>
+                                  </p:childTnLst>
+                                </p:cTn>
+                              </p:par>
+                            </p:childTnLst>
+                          </p:cTn>
+                        </p:par>
+                      </p:childTnLst>
+                    </p:cTn>
+                  </p:par>
                 </p:childTnLst>
               </p:cTn>
               <p:prevCondLst>
@@ -9905,8 +10469,8 @@
           </a:p>
         </p:txBody>
       </p:sp>
-      <mc:AlternateContent xmlns:mc="http://schemas.openxmlformats.org/markup-compatibility/2006" xmlns:a14="http://schemas.microsoft.com/office/drawing/2010/main">
-        <mc:Choice Requires="a14">
+      <mc:AlternateContent xmlns:mc="http://schemas.openxmlformats.org/markup-compatibility/2006">
+        <mc:Choice xmlns:a14="http://schemas.microsoft.com/office/drawing/2010/main" Requires="a14">
           <p:sp>
             <p:nvSpPr>
               <p:cNvPr id="3" name="Content Placeholder 2">
@@ -10090,7 +10654,7 @@
                   <a:rPr lang="en-US" dirty="0">
                     <a:cs typeface="Segoe UI" panose="020B0502040204020203" pitchFamily="34" charset="0"/>
                   </a:rPr>
-                  <a:t>For all components the </a:t>
+                  <a:t>The </a:t>
                 </a:r>
                 <a:r>
                   <a:rPr lang="en-US" b="1" dirty="0">
@@ -10245,6 +10809,20 @@
                 </a:r>
               </a:p>
               <a:p>
+                <a:pPr lvl="1">
+                  <a:tabLst>
+                    <a:tab pos="7543800" algn="l"/>
+                  </a:tabLst>
+                </a:pPr>
+                <a:r>
+                  <a:rPr lang="en-US" b="1" dirty="0">
+                    <a:latin typeface="Cambria Math" panose="02040503050406030204" pitchFamily="18" charset="0"/>
+                    <a:cs typeface="Segoe UI" panose="020B0502040204020203" pitchFamily="34" charset="0"/>
+                  </a:rPr>
+                  <a:t>Transformation is from a Euclidean space another Euclidean space</a:t>
+                </a:r>
+              </a:p>
+              <a:p>
                 <a:pPr marL="0" indent="0">
                   <a:buNone/>
                   <a:tabLst>
@@ -10292,7 +10870,7 @@
             </p:txBody>
           </p:sp>
         </mc:Choice>
-        <mc:Fallback xmlns="">
+        <mc:Fallback>
           <p:sp>
             <p:nvSpPr>
               <p:cNvPr id="3" name="Content Placeholder 2">
@@ -10317,7 +10895,7 @@
               <a:blipFill>
                 <a:blip r:embed="rId2"/>
                 <a:stretch>
-                  <a:fillRect l="-1058" t="-1804" r="-1692"/>
+                  <a:fillRect l="-1058" t="-1804"/>
                 </a:stretch>
               </a:blipFill>
             </p:spPr>
@@ -10619,6 +11197,37 @@
                                   </p:childTnLst>
                                 </p:cTn>
                               </p:par>
+                              <p:par>
+                                <p:cTn id="23" presetID="1" presetClass="entr" presetSubtype="0" fill="hold" nodeType="withEffect">
+                                  <p:stCondLst>
+                                    <p:cond delay="0"/>
+                                  </p:stCondLst>
+                                  <p:childTnLst>
+                                    <p:set>
+                                      <p:cBhvr>
+                                        <p:cTn id="24" dur="1" fill="hold">
+                                          <p:stCondLst>
+                                            <p:cond delay="0"/>
+                                          </p:stCondLst>
+                                        </p:cTn>
+                                        <p:tgtEl>
+                                          <p:spTgt spid="3">
+                                            <p:txEl>
+                                              <p:pRg st="8" end="8"/>
+                                            </p:txEl>
+                                          </p:spTgt>
+                                        </p:tgtEl>
+                                        <p:attrNameLst>
+                                          <p:attrName>style.visibility</p:attrName>
+                                        </p:attrNameLst>
+                                      </p:cBhvr>
+                                      <p:to>
+                                        <p:strVal val="visible"/>
+                                      </p:to>
+                                    </p:set>
+                                  </p:childTnLst>
+                                </p:cTn>
+                              </p:par>
                             </p:childTnLst>
                           </p:cTn>
                         </p:par>
@@ -10696,8 +11305,8 @@
           </a:p>
         </p:txBody>
       </p:sp>
-      <mc:AlternateContent xmlns:mc="http://schemas.openxmlformats.org/markup-compatibility/2006" xmlns:a14="http://schemas.microsoft.com/office/drawing/2010/main">
-        <mc:Choice Requires="a14">
+      <mc:AlternateContent xmlns:mc="http://schemas.openxmlformats.org/markup-compatibility/2006">
+        <mc:Choice xmlns:a14="http://schemas.microsoft.com/office/drawing/2010/main" Requires="a14">
           <p:sp>
             <p:nvSpPr>
               <p:cNvPr id="3" name="Content Placeholder 2"/>
@@ -10798,14 +11407,11 @@
                   <a:rPr lang="en-US" b="1" dirty="0">
                     <a:latin typeface="+mn-lt"/>
                   </a:rPr>
-                  <a:t>Not an affine transformation </a:t>
+                  <a:t>Not an affine transformation</a:t>
                 </a:r>
-                <a:r>
-                  <a:rPr lang="en-US" dirty="0">
-                    <a:latin typeface="+mn-lt"/>
-                  </a:rPr>
-                  <a:t> </a:t>
-                </a:r>
+                <a:endParaRPr lang="en-US" dirty="0">
+                  <a:latin typeface="+mn-lt"/>
+                </a:endParaRPr>
               </a:p>
               <a:p>
                 <a:pPr marL="0" indent="0">
@@ -10879,7 +11485,7 @@
             </p:txBody>
           </p:sp>
         </mc:Choice>
-        <mc:Fallback xmlns="">
+        <mc:Fallback>
           <p:sp>
             <p:nvSpPr>
               <p:cNvPr id="3" name="Content Placeholder 2"/>
@@ -12499,8 +13105,8 @@
           </a:p>
         </p:txBody>
       </p:sp>
-      <mc:AlternateContent xmlns:mc="http://schemas.openxmlformats.org/markup-compatibility/2006" xmlns:a14="http://schemas.microsoft.com/office/drawing/2010/main">
-        <mc:Choice Requires="a14">
+      <mc:AlternateContent xmlns:mc="http://schemas.openxmlformats.org/markup-compatibility/2006">
+        <mc:Choice xmlns:a14="http://schemas.microsoft.com/office/drawing/2010/main" Requires="a14">
           <p:sp>
             <p:nvSpPr>
               <p:cNvPr id="3" name="Content Placeholder 2">
@@ -12667,12 +13273,9 @@
                     </m:r>
                   </m:oMath>
                 </a14:m>
-                <a:r>
-                  <a:rPr lang="en-US" dirty="0">
-                    <a:cs typeface="Segoe UI" panose="020B0502040204020203" pitchFamily="34" charset="0"/>
-                  </a:rPr>
-                  <a:t> </a:t>
-                </a:r>
+                <a:endParaRPr lang="en-US" dirty="0">
+                  <a:cs typeface="Segoe UI" panose="020B0502040204020203" pitchFamily="34" charset="0"/>
+                </a:endParaRPr>
               </a:p>
               <a:p>
                 <a:pPr lvl="1">
@@ -12737,7 +13340,7 @@
             </p:txBody>
           </p:sp>
         </mc:Choice>
-        <mc:Fallback xmlns="">
+        <mc:Fallback>
           <p:sp>
             <p:nvSpPr>
               <p:cNvPr id="3" name="Content Placeholder 2">
@@ -13101,8 +13704,8 @@
           </a:p>
         </p:txBody>
       </p:sp>
-      <mc:AlternateContent xmlns:mc="http://schemas.openxmlformats.org/markup-compatibility/2006" xmlns:a14="http://schemas.microsoft.com/office/drawing/2010/main">
-        <mc:Choice Requires="a14">
+      <mc:AlternateContent xmlns:mc="http://schemas.openxmlformats.org/markup-compatibility/2006">
+        <mc:Choice xmlns:a14="http://schemas.microsoft.com/office/drawing/2010/main" Requires="a14">
           <p:sp>
             <p:nvSpPr>
               <p:cNvPr id="3" name="Content Placeholder 2">
@@ -13566,46 +14169,46 @@
                   <a:rPr lang="en-US" dirty="0">
                     <a:cs typeface="Segoe UI" panose="020B0502040204020203" pitchFamily="34" charset="0"/>
                   </a:rPr>
-                  <a:t> is the projection of the first </a:t>
+                  <a:t> is the projection to an </a:t>
+                </a:r>
+                <a:r>
+                  <a:rPr lang="en-US" dirty="0" err="1">
+                    <a:cs typeface="Segoe UI" panose="020B0502040204020203" pitchFamily="34" charset="0"/>
+                  </a:rPr>
+                  <a:t>orthongonal</a:t>
+                </a:r>
+                <a:r>
+                  <a:rPr lang="en-US" dirty="0">
+                    <a:cs typeface="Segoe UI" panose="020B0502040204020203" pitchFamily="34" charset="0"/>
+                  </a:rPr>
+                  <a:t> </a:t>
+                </a:r>
+                <a:r>
+                  <a:rPr lang="en-US" dirty="0" err="1">
+                    <a:cs typeface="Segoe UI" panose="020B0502040204020203" pitchFamily="34" charset="0"/>
+                  </a:rPr>
+                  <a:t>Euclideian</a:t>
+                </a:r>
+                <a:r>
+                  <a:rPr lang="en-US" dirty="0">
+                    <a:cs typeface="Segoe UI" panose="020B0502040204020203" pitchFamily="34" charset="0"/>
+                  </a:rPr>
+                  <a:t> space with </a:t>
+                </a:r>
+                <a:r>
+                  <a:rPr lang="en-US" b="1" dirty="0">
+                    <a:cs typeface="Segoe UI" panose="020B0502040204020203" pitchFamily="34" charset="0"/>
+                  </a:rPr>
+                  <a:t>first </a:t>
                 </a:r>
                 <a14:m>
                   <m:oMath xmlns:m="http://schemas.openxmlformats.org/officeDocument/2006/math">
                     <m:r>
-                      <a:rPr lang="en-US" b="0" i="1" smtClean="0">
+                      <a:rPr lang="en-US" b="1" i="1" smtClean="0">
                         <a:latin typeface="Cambria Math" panose="02040503050406030204" pitchFamily="18" charset="0"/>
                         <a:cs typeface="Segoe UI" panose="020B0502040204020203" pitchFamily="34" charset="0"/>
                       </a:rPr>
-                      <m:t>𝑙</m:t>
-                    </m:r>
-                  </m:oMath>
-                </a14:m>
-                <a:r>
-                  <a:rPr lang="en-US" dirty="0">
-                    <a:cs typeface="Segoe UI" panose="020B0502040204020203" pitchFamily="34" charset="0"/>
-                  </a:rPr>
-                  <a:t> principle components</a:t>
-                </a:r>
-              </a:p>
-              <a:p>
-                <a:pPr>
-                  <a:tabLst>
-                    <a:tab pos="7543800" algn="l"/>
-                  </a:tabLst>
-                </a:pPr>
-                <a:r>
-                  <a:rPr lang="en-US" dirty="0">
-                    <a:cs typeface="Segoe UI" panose="020B0502040204020203" pitchFamily="34" charset="0"/>
-                  </a:rPr>
-                  <a:t>Projection has the </a:t>
-                </a:r>
-                <a14:m>
-                  <m:oMath xmlns:m="http://schemas.openxmlformats.org/officeDocument/2006/math">
-                    <m:r>
-                      <a:rPr lang="en-US" b="0" i="1" smtClean="0">
-                        <a:latin typeface="Cambria Math" panose="02040503050406030204" pitchFamily="18" charset="0"/>
-                        <a:cs typeface="Segoe UI" panose="020B0502040204020203" pitchFamily="34" charset="0"/>
-                      </a:rPr>
-                      <m:t>𝑙</m:t>
+                      <m:t>𝒍</m:t>
                     </m:r>
                   </m:oMath>
                 </a14:m>
@@ -13613,7 +14216,7 @@
                   <a:rPr lang="en-US" b="1" dirty="0">
                     <a:cs typeface="Segoe UI" panose="020B0502040204020203" pitchFamily="34" charset="0"/>
                   </a:rPr>
-                  <a:t> components which explain the most variance   </a:t>
+                  <a:t> principle components as axes</a:t>
                 </a:r>
               </a:p>
               <a:p>
@@ -13663,7 +14266,7 @@
             </p:txBody>
           </p:sp>
         </mc:Choice>
-        <mc:Fallback xmlns="">
+        <mc:Fallback>
           <p:sp>
             <p:nvSpPr>
               <p:cNvPr id="3" name="Content Placeholder 2">
@@ -13903,55 +14506,6 @@
                       </p:childTnLst>
                     </p:cTn>
                   </p:par>
-                  <p:par>
-                    <p:cTn id="17" fill="hold">
-                      <p:stCondLst>
-                        <p:cond delay="indefinite"/>
-                      </p:stCondLst>
-                      <p:childTnLst>
-                        <p:par>
-                          <p:cTn id="18" fill="hold">
-                            <p:stCondLst>
-                              <p:cond delay="0"/>
-                            </p:stCondLst>
-                            <p:childTnLst>
-                              <p:par>
-                                <p:cTn id="19" presetID="1" presetClass="entr" presetSubtype="0" fill="hold" nodeType="clickEffect">
-                                  <p:stCondLst>
-                                    <p:cond delay="0"/>
-                                  </p:stCondLst>
-                                  <p:childTnLst>
-                                    <p:set>
-                                      <p:cBhvr>
-                                        <p:cTn id="20" dur="1" fill="hold">
-                                          <p:stCondLst>
-                                            <p:cond delay="0"/>
-                                          </p:stCondLst>
-                                        </p:cTn>
-                                        <p:tgtEl>
-                                          <p:spTgt spid="3">
-                                            <p:txEl>
-                                              <p:pRg st="8" end="8"/>
-                                            </p:txEl>
-                                          </p:spTgt>
-                                        </p:tgtEl>
-                                        <p:attrNameLst>
-                                          <p:attrName>style.visibility</p:attrName>
-                                        </p:attrNameLst>
-                                      </p:cBhvr>
-                                      <p:to>
-                                        <p:strVal val="visible"/>
-                                      </p:to>
-                                    </p:set>
-                                  </p:childTnLst>
-                                </p:cTn>
-                              </p:par>
-                            </p:childTnLst>
-                          </p:cTn>
-                        </p:par>
-                      </p:childTnLst>
-                    </p:cTn>
-                  </p:par>
                 </p:childTnLst>
               </p:cTn>
               <p:prevCondLst>
@@ -14510,8 +15064,8 @@
           </a:p>
         </p:txBody>
       </p:sp>
-      <mc:AlternateContent xmlns:mc="http://schemas.openxmlformats.org/markup-compatibility/2006" xmlns:a14="http://schemas.microsoft.com/office/drawing/2010/main">
-        <mc:Choice Requires="a14">
+      <mc:AlternateContent xmlns:mc="http://schemas.openxmlformats.org/markup-compatibility/2006">
+        <mc:Choice xmlns:a14="http://schemas.microsoft.com/office/drawing/2010/main" Requires="a14">
           <p:sp>
             <p:nvSpPr>
               <p:cNvPr id="3" name="Content Placeholder 2"/>
@@ -14562,13 +15116,48 @@
                       <m:jc m:val="centerGroup"/>
                     </m:oMathParaPr>
                     <m:oMath xmlns:m="http://schemas.openxmlformats.org/officeDocument/2006/math">
-                      <m:r>
-                        <a:rPr lang="en-US" i="1">
-                          <a:latin typeface="Cambria Math" panose="02040503050406030204" pitchFamily="18" charset="0"/>
-                          <a:cs typeface="Segoe UI" panose="020B0502040204020203" pitchFamily="34" charset="0"/>
-                        </a:rPr>
-                        <m:t>𝑇</m:t>
-                      </m:r>
+                      <m:sSup>
+                        <m:sSupPr>
+                          <m:ctrlPr>
+                            <a:rPr lang="en-US" i="1" smtClean="0">
+                              <a:latin typeface="Cambria Math" panose="02040503050406030204" pitchFamily="18" charset="0"/>
+                              <a:cs typeface="Segoe UI" panose="020B0502040204020203" pitchFamily="34" charset="0"/>
+                            </a:rPr>
+                          </m:ctrlPr>
+                        </m:sSupPr>
+                        <m:e>
+                          <m:r>
+                            <a:rPr lang="en-US" b="0" i="1" smtClean="0">
+                              <a:latin typeface="Cambria Math" panose="02040503050406030204" pitchFamily="18" charset="0"/>
+                              <a:cs typeface="Segoe UI" panose="020B0502040204020203" pitchFamily="34" charset="0"/>
+                            </a:rPr>
+                            <m:t>𝑇</m:t>
+                          </m:r>
+                        </m:e>
+                        <m:sup>
+                          <m:r>
+                            <a:rPr lang="en-US" b="0" i="1" smtClean="0">
+                              <a:latin typeface="Cambria Math" panose="02040503050406030204" pitchFamily="18" charset="0"/>
+                              <a:cs typeface="Segoe UI" panose="020B0502040204020203" pitchFamily="34" charset="0"/>
+                            </a:rPr>
+                            <m:t>(</m:t>
+                          </m:r>
+                          <m:r>
+                            <a:rPr lang="en-US" b="0" i="1" smtClean="0">
+                              <a:latin typeface="Cambria Math" panose="02040503050406030204" pitchFamily="18" charset="0"/>
+                              <a:cs typeface="Segoe UI" panose="020B0502040204020203" pitchFamily="34" charset="0"/>
+                            </a:rPr>
+                            <m:t>𝑙</m:t>
+                          </m:r>
+                          <m:r>
+                            <a:rPr lang="en-US" b="0" i="1" smtClean="0">
+                              <a:latin typeface="Cambria Math" panose="02040503050406030204" pitchFamily="18" charset="0"/>
+                              <a:cs typeface="Segoe UI" panose="020B0502040204020203" pitchFamily="34" charset="0"/>
+                            </a:rPr>
+                            <m:t>)</m:t>
+                          </m:r>
+                        </m:sup>
+                      </m:sSup>
                       <m:r>
                         <a:rPr lang="en-US" i="1">
                           <a:latin typeface="Cambria Math" panose="02040503050406030204" pitchFamily="18" charset="0"/>
@@ -14581,8 +15170,50 @@
                           <a:latin typeface="Cambria Math" panose="02040503050406030204" pitchFamily="18" charset="0"/>
                           <a:cs typeface="Segoe UI" panose="020B0502040204020203" pitchFamily="34" charset="0"/>
                         </a:rPr>
-                        <m:t>𝑋𝑊</m:t>
+                        <m:t>𝑋</m:t>
                       </m:r>
+                      <m:sSup>
+                        <m:sSupPr>
+                          <m:ctrlPr>
+                            <a:rPr lang="en-US" i="1" smtClean="0">
+                              <a:latin typeface="Cambria Math" panose="02040503050406030204" pitchFamily="18" charset="0"/>
+                              <a:cs typeface="Segoe UI" panose="020B0502040204020203" pitchFamily="34" charset="0"/>
+                            </a:rPr>
+                          </m:ctrlPr>
+                        </m:sSupPr>
+                        <m:e>
+                          <m:r>
+                            <a:rPr lang="en-US" b="0" i="1" smtClean="0">
+                              <a:latin typeface="Cambria Math" panose="02040503050406030204" pitchFamily="18" charset="0"/>
+                              <a:cs typeface="Segoe UI" panose="020B0502040204020203" pitchFamily="34" charset="0"/>
+                            </a:rPr>
+                            <m:t>𝑊</m:t>
+                          </m:r>
+                        </m:e>
+                        <m:sup>
+                          <m:r>
+                            <a:rPr lang="en-US" b="0" i="1" smtClean="0">
+                              <a:latin typeface="Cambria Math" panose="02040503050406030204" pitchFamily="18" charset="0"/>
+                              <a:cs typeface="Segoe UI" panose="020B0502040204020203" pitchFamily="34" charset="0"/>
+                            </a:rPr>
+                            <m:t>(</m:t>
+                          </m:r>
+                          <m:r>
+                            <a:rPr lang="en-US" b="0" i="1" smtClean="0">
+                              <a:latin typeface="Cambria Math" panose="02040503050406030204" pitchFamily="18" charset="0"/>
+                              <a:cs typeface="Segoe UI" panose="020B0502040204020203" pitchFamily="34" charset="0"/>
+                            </a:rPr>
+                            <m:t>𝑙</m:t>
+                          </m:r>
+                          <m:r>
+                            <a:rPr lang="en-US" b="0" i="1" smtClean="0">
+                              <a:latin typeface="Cambria Math" panose="02040503050406030204" pitchFamily="18" charset="0"/>
+                              <a:cs typeface="Segoe UI" panose="020B0502040204020203" pitchFamily="34" charset="0"/>
+                            </a:rPr>
+                            <m:t>)</m:t>
+                          </m:r>
+                        </m:sup>
+                      </m:sSup>
                       <m:r>
                         <a:rPr lang="en-US" b="0" i="1" smtClean="0">
                           <a:latin typeface="Cambria Math" panose="02040503050406030204" pitchFamily="18" charset="0"/>
@@ -14666,15 +15297,50 @@
                           <a:latin typeface="Cambria Math" panose="02040503050406030204" pitchFamily="18" charset="0"/>
                           <a:cs typeface="Segoe UI" panose="020B0502040204020203" pitchFamily="34" charset="0"/>
                         </a:rPr>
-                        <m:t> </m:t>
+                        <m:t>,</m:t>
                       </m:r>
-                      <m:r>
-                        <a:rPr lang="en-US" b="0" i="1" smtClean="0">
-                          <a:latin typeface="Cambria Math" panose="02040503050406030204" pitchFamily="18" charset="0"/>
-                          <a:cs typeface="Segoe UI" panose="020B0502040204020203" pitchFamily="34" charset="0"/>
-                        </a:rPr>
-                        <m:t>𝑇</m:t>
-                      </m:r>
+                      <m:sSup>
+                        <m:sSupPr>
+                          <m:ctrlPr>
+                            <a:rPr lang="en-US" i="1">
+                              <a:latin typeface="Cambria Math" panose="02040503050406030204" pitchFamily="18" charset="0"/>
+                              <a:cs typeface="Segoe UI" panose="020B0502040204020203" pitchFamily="34" charset="0"/>
+                            </a:rPr>
+                          </m:ctrlPr>
+                        </m:sSupPr>
+                        <m:e>
+                          <m:r>
+                            <a:rPr lang="en-US" i="1">
+                              <a:latin typeface="Cambria Math" panose="02040503050406030204" pitchFamily="18" charset="0"/>
+                              <a:cs typeface="Segoe UI" panose="020B0502040204020203" pitchFamily="34" charset="0"/>
+                            </a:rPr>
+                            <m:t>𝑇</m:t>
+                          </m:r>
+                        </m:e>
+                        <m:sup>
+                          <m:r>
+                            <a:rPr lang="en-US" b="0" i="1" smtClean="0">
+                              <a:latin typeface="Cambria Math" panose="02040503050406030204" pitchFamily="18" charset="0"/>
+                              <a:cs typeface="Segoe UI" panose="020B0502040204020203" pitchFamily="34" charset="0"/>
+                            </a:rPr>
+                            <m:t>(</m:t>
+                          </m:r>
+                          <m:r>
+                            <a:rPr lang="en-US" i="1">
+                              <a:latin typeface="Cambria Math" panose="02040503050406030204" pitchFamily="18" charset="0"/>
+                              <a:cs typeface="Segoe UI" panose="020B0502040204020203" pitchFamily="34" charset="0"/>
+                            </a:rPr>
+                            <m:t>𝑙</m:t>
+                          </m:r>
+                          <m:r>
+                            <a:rPr lang="en-US" b="0" i="1" smtClean="0">
+                              <a:latin typeface="Cambria Math" panose="02040503050406030204" pitchFamily="18" charset="0"/>
+                              <a:cs typeface="Segoe UI" panose="020B0502040204020203" pitchFamily="34" charset="0"/>
+                            </a:rPr>
+                            <m:t>)</m:t>
+                          </m:r>
+                        </m:sup>
+                      </m:sSup>
                       <m:r>
                         <a:rPr lang="en-US" b="0" i="1" smtClean="0">
                           <a:latin typeface="Cambria Math" panose="02040503050406030204" pitchFamily="18" charset="0"/>
@@ -14722,7 +15388,23 @@
                               <a:ea typeface="Cambria Math" panose="02040503050406030204" pitchFamily="18" charset="0"/>
                               <a:cs typeface="Segoe UI" panose="020B0502040204020203" pitchFamily="34" charset="0"/>
                             </a:rPr>
+                            <m:t>(</m:t>
+                          </m:r>
+                          <m:r>
+                            <a:rPr lang="en-US" b="0" i="1" smtClean="0">
+                              <a:latin typeface="Cambria Math" panose="02040503050406030204" pitchFamily="18" charset="0"/>
+                              <a:ea typeface="Cambria Math" panose="02040503050406030204" pitchFamily="18" charset="0"/>
+                              <a:cs typeface="Segoe UI" panose="020B0502040204020203" pitchFamily="34" charset="0"/>
+                            </a:rPr>
                             <m:t>𝑙</m:t>
+                          </m:r>
+                          <m:r>
+                            <a:rPr lang="en-US" b="0" i="1" smtClean="0">
+                              <a:latin typeface="Cambria Math" panose="02040503050406030204" pitchFamily="18" charset="0"/>
+                              <a:ea typeface="Cambria Math" panose="02040503050406030204" pitchFamily="18" charset="0"/>
+                              <a:cs typeface="Segoe UI" panose="020B0502040204020203" pitchFamily="34" charset="0"/>
+                            </a:rPr>
+                            <m:t>)</m:t>
                           </m:r>
                         </m:sup>
                       </m:sSup>
@@ -14752,7 +15434,7 @@
                           <a:latin typeface="Cambria Math" panose="02040503050406030204" pitchFamily="18" charset="0"/>
                           <a:cs typeface="Segoe UI" panose="020B0502040204020203" pitchFamily="34" charset="0"/>
                         </a:rPr>
-                        <m:t>𝑞</m:t>
+                        <m:t>𝑙</m:t>
                       </m:r>
                       <m:r>
                         <a:rPr lang="en-US" b="0" i="1" smtClean="0">
@@ -14780,7 +15462,7 @@
                   <a:rPr lang="en-US" b="1" dirty="0">
                     <a:latin typeface="+mn-lt"/>
                   </a:rPr>
-                  <a:t>dependency between variables is linear and constant   </a:t>
+                  <a:t>dependency between variables is linear</a:t>
                 </a:r>
               </a:p>
               <a:p>
@@ -14838,7 +15520,7 @@
                   <a:rPr lang="en-US" b="1" dirty="0">
                     <a:latin typeface="+mn-lt"/>
                   </a:rPr>
-                  <a:t>approximately preserves distances</a:t>
+                  <a:t>approximately preserves Euclidian distances</a:t>
                 </a:r>
               </a:p>
               <a:p>
@@ -14888,7 +15570,7 @@
             </p:txBody>
           </p:sp>
         </mc:Choice>
-        <mc:Fallback xmlns="">
+        <mc:Fallback>
           <p:sp>
             <p:nvSpPr>
               <p:cNvPr id="3" name="Content Placeholder 2"/>
@@ -14907,7 +15589,7 @@
               <a:blipFill>
                 <a:blip r:embed="rId3"/>
                 <a:stretch>
-                  <a:fillRect l="-1111" t="-1883" b="-1772"/>
+                  <a:fillRect l="-1111" t="-1883" b="-1883"/>
                 </a:stretch>
               </a:blipFill>
             </p:spPr>
@@ -16065,12 +16747,12 @@
         <p:spPr>
           <a:xfrm>
             <a:off x="333375" y="1004776"/>
-            <a:ext cx="10766425" cy="530954"/>
+            <a:ext cx="11626396" cy="530954"/>
           </a:xfrm>
         </p:spPr>
         <p:txBody>
           <a:bodyPr>
-            <a:normAutofit/>
+            <a:normAutofit fontScale="92500"/>
           </a:bodyPr>
           <a:lstStyle/>
           <a:p>
@@ -16081,7 +16763,7 @@
               <a:rPr lang="en-US" dirty="0">
                 <a:latin typeface="+mn-lt"/>
               </a:rPr>
-              <a:t>Example, Iris dataset</a:t>
+              <a:t>Example, first 2 principle components explain about 95% of variance for Iris dataset</a:t>
             </a:r>
           </a:p>
         </p:txBody>
@@ -16686,8 +17368,8 @@
           </a:p>
         </p:txBody>
       </p:sp>
-      <mc:AlternateContent xmlns:mc="http://schemas.openxmlformats.org/markup-compatibility/2006" xmlns:a14="http://schemas.microsoft.com/office/drawing/2010/main">
-        <mc:Choice Requires="a14">
+      <mc:AlternateContent xmlns:mc="http://schemas.openxmlformats.org/markup-compatibility/2006">
+        <mc:Choice xmlns:a14="http://schemas.microsoft.com/office/drawing/2010/main" Requires="a14">
           <p:sp>
             <p:nvSpPr>
               <p:cNvPr id="3" name="Content Placeholder 2">
@@ -16712,7 +17394,7 @@
             </p:spPr>
             <p:txBody>
               <a:bodyPr>
-                <a:normAutofit/>
+                <a:normAutofit lnSpcReduction="10000"/>
               </a:bodyPr>
               <a:lstStyle/>
               <a:p>
@@ -16964,7 +17646,6 @@
                 </a:r>
               </a:p>
               <a:p>
-                <a:pPr lvl="1"/>
                 <a:r>
                   <a:rPr lang="en-US" dirty="0">
                     <a:cs typeface="Segoe UI" panose="020B0502040204020203" pitchFamily="34" charset="0"/>
@@ -17101,7 +17782,7 @@
                           <a:latin typeface="Cambria Math" panose="02040503050406030204" pitchFamily="18" charset="0"/>
                           <a:cs typeface="Segoe UI" panose="020B0502040204020203" pitchFamily="34" charset="0"/>
                         </a:rPr>
-                        <m:t>𝑉</m:t>
+                        <m:t>𝑈</m:t>
                       </m:r>
                       <m:r>
                         <a:rPr lang="en-US" sz="2800" b="0" i="1" smtClean="0">
@@ -17292,7 +17973,7 @@
                           <a:latin typeface="Cambria Math" panose="02040503050406030204" pitchFamily="18" charset="0"/>
                           <a:cs typeface="Segoe UI" panose="020B0502040204020203" pitchFamily="34" charset="0"/>
                         </a:rPr>
-                        <m:t>𝑊</m:t>
+                        <m:t>𝑉</m:t>
                       </m:r>
                       <m:r>
                         <a:rPr lang="en-US" sz="2800" b="0" i="1" smtClean="0">
@@ -17367,7 +18048,7 @@
             </p:txBody>
           </p:sp>
         </mc:Choice>
-        <mc:Fallback xmlns="">
+        <mc:Fallback>
           <p:sp>
             <p:nvSpPr>
               <p:cNvPr id="3" name="Content Placeholder 2">
@@ -17392,7 +18073,7 @@
               <a:blipFill>
                 <a:blip r:embed="rId2"/>
                 <a:stretch>
-                  <a:fillRect l="-1058" t="-1917" b="-451"/>
+                  <a:fillRect l="-1058" t="-2593"/>
                 </a:stretch>
               </a:blipFill>
             </p:spPr>
@@ -17503,15 +18184,33 @@
                                   </p:childTnLst>
                                 </p:cTn>
                               </p:par>
+                            </p:childTnLst>
+                          </p:cTn>
+                        </p:par>
+                      </p:childTnLst>
+                    </p:cTn>
+                  </p:par>
+                  <p:par>
+                    <p:cTn id="9" fill="hold">
+                      <p:stCondLst>
+                        <p:cond delay="indefinite"/>
+                      </p:stCondLst>
+                      <p:childTnLst>
+                        <p:par>
+                          <p:cTn id="10" fill="hold">
+                            <p:stCondLst>
+                              <p:cond delay="0"/>
+                            </p:stCondLst>
+                            <p:childTnLst>
                               <p:par>
-                                <p:cTn id="9" presetID="1" presetClass="entr" presetSubtype="0" fill="hold" nodeType="withEffect">
+                                <p:cTn id="11" presetID="1" presetClass="entr" presetSubtype="0" fill="hold" nodeType="clickEffect">
                                   <p:stCondLst>
                                     <p:cond delay="0"/>
                                   </p:stCondLst>
                                   <p:childTnLst>
                                     <p:set>
                                       <p:cBhvr>
-                                        <p:cTn id="10" dur="1" fill="hold">
+                                        <p:cTn id="12" dur="1" fill="hold">
                                           <p:stCondLst>
                                             <p:cond delay="0"/>
                                           </p:stCondLst>
@@ -17541,50 +18240,19 @@
                     </p:cTn>
                   </p:par>
                   <p:par>
-                    <p:cTn id="11" fill="hold">
+                    <p:cTn id="13" fill="hold">
                       <p:stCondLst>
                         <p:cond delay="indefinite"/>
                       </p:stCondLst>
                       <p:childTnLst>
                         <p:par>
-                          <p:cTn id="12" fill="hold">
+                          <p:cTn id="14" fill="hold">
                             <p:stCondLst>
                               <p:cond delay="0"/>
                             </p:stCondLst>
                             <p:childTnLst>
                               <p:par>
-                                <p:cTn id="13" presetID="1" presetClass="entr" presetSubtype="0" fill="hold" nodeType="clickEffect">
-                                  <p:stCondLst>
-                                    <p:cond delay="0"/>
-                                  </p:stCondLst>
-                                  <p:childTnLst>
-                                    <p:set>
-                                      <p:cBhvr>
-                                        <p:cTn id="14" dur="1" fill="hold">
-                                          <p:stCondLst>
-                                            <p:cond delay="0"/>
-                                          </p:stCondLst>
-                                        </p:cTn>
-                                        <p:tgtEl>
-                                          <p:spTgt spid="3">
-                                            <p:txEl>
-                                              <p:pRg st="4" end="4"/>
-                                            </p:txEl>
-                                          </p:spTgt>
-                                        </p:tgtEl>
-                                        <p:attrNameLst>
-                                          <p:attrName>style.visibility</p:attrName>
-                                        </p:attrNameLst>
-                                      </p:cBhvr>
-                                      <p:to>
-                                        <p:strVal val="visible"/>
-                                      </p:to>
-                                    </p:set>
-                                  </p:childTnLst>
-                                </p:cTn>
-                              </p:par>
-                              <p:par>
-                                <p:cTn id="15" presetID="1" presetClass="entr" presetSubtype="0" fill="hold" nodeType="withEffect">
+                                <p:cTn id="15" presetID="1" presetClass="entr" presetSubtype="0" fill="hold" nodeType="clickEffect">
                                   <p:stCondLst>
                                     <p:cond delay="0"/>
                                   </p:stCondLst>
@@ -17599,7 +18267,7 @@
                                         <p:tgtEl>
                                           <p:spTgt spid="3">
                                             <p:txEl>
-                                              <p:pRg st="5" end="5"/>
+                                              <p:pRg st="4" end="4"/>
                                             </p:txEl>
                                           </p:spTgt>
                                         </p:tgtEl>
@@ -17630,7 +18298,7 @@
                                         <p:tgtEl>
                                           <p:spTgt spid="3">
                                             <p:txEl>
-                                              <p:pRg st="6" end="6"/>
+                                              <p:pRg st="5" end="5"/>
                                             </p:txEl>
                                           </p:spTgt>
                                         </p:tgtEl>
@@ -17661,7 +18329,7 @@
                                         <p:tgtEl>
                                           <p:spTgt spid="3">
                                             <p:txEl>
-                                              <p:pRg st="7" end="7"/>
+                                              <p:pRg st="6" end="6"/>
                                             </p:txEl>
                                           </p:spTgt>
                                         </p:tgtEl>
@@ -17692,7 +18360,7 @@
                                         <p:tgtEl>
                                           <p:spTgt spid="3">
                                             <p:txEl>
-                                              <p:pRg st="8" end="8"/>
+                                              <p:pRg st="7" end="7"/>
                                             </p:txEl>
                                           </p:spTgt>
                                         </p:tgtEl>
@@ -17716,6 +18384,37 @@
                                     <p:set>
                                       <p:cBhvr>
                                         <p:cTn id="24" dur="1" fill="hold">
+                                          <p:stCondLst>
+                                            <p:cond delay="0"/>
+                                          </p:stCondLst>
+                                        </p:cTn>
+                                        <p:tgtEl>
+                                          <p:spTgt spid="3">
+                                            <p:txEl>
+                                              <p:pRg st="8" end="8"/>
+                                            </p:txEl>
+                                          </p:spTgt>
+                                        </p:tgtEl>
+                                        <p:attrNameLst>
+                                          <p:attrName>style.visibility</p:attrName>
+                                        </p:attrNameLst>
+                                      </p:cBhvr>
+                                      <p:to>
+                                        <p:strVal val="visible"/>
+                                      </p:to>
+                                    </p:set>
+                                  </p:childTnLst>
+                                </p:cTn>
+                              </p:par>
+                              <p:par>
+                                <p:cTn id="25" presetID="1" presetClass="entr" presetSubtype="0" fill="hold" nodeType="withEffect">
+                                  <p:stCondLst>
+                                    <p:cond delay="0"/>
+                                  </p:stCondLst>
+                                  <p:childTnLst>
+                                    <p:set>
+                                      <p:cBhvr>
+                                        <p:cTn id="26" dur="1" fill="hold">
                                           <p:stCondLst>
                                             <p:cond delay="0"/>
                                           </p:stCondLst>
@@ -17858,7 +18557,7 @@
               <a:rPr lang="en-US" dirty="0">
                 <a:latin typeface="+mn-lt"/>
               </a:rPr>
-              <a:t>Consider sampling required to maintain the same uniformly distributed density in a hypercube: </a:t>
+              <a:t>Consider sampling required to maintain the same uniformly distributed sampling density in a hypercube: </a:t>
             </a:r>
           </a:p>
           <a:p>
@@ -18444,8 +19143,8 @@
           </a:p>
         </p:txBody>
       </p:sp>
-      <mc:AlternateContent xmlns:mc="http://schemas.openxmlformats.org/markup-compatibility/2006" xmlns:a14="http://schemas.microsoft.com/office/drawing/2010/main">
-        <mc:Choice Requires="a14">
+      <mc:AlternateContent xmlns:mc="http://schemas.openxmlformats.org/markup-compatibility/2006">
+        <mc:Choice xmlns:a14="http://schemas.microsoft.com/office/drawing/2010/main" Requires="a14">
           <p:sp>
             <p:nvSpPr>
               <p:cNvPr id="3" name="Content Placeholder 2">
@@ -18572,12 +19271,12 @@
                         </m:sSupPr>
                         <m:e>
                           <m:r>
-                            <a:rPr lang="en-US" i="1">
+                            <a:rPr lang="en-US" b="0" i="1" smtClean="0">
                               <a:latin typeface="Cambria Math" panose="02040503050406030204" pitchFamily="18" charset="0"/>
                               <a:ea typeface="Cambria Math" panose="02040503050406030204" pitchFamily="18" charset="0"/>
                               <a:cs typeface="Segoe UI" panose="020B0502040204020203" pitchFamily="34" charset="0"/>
                             </a:rPr>
-                            <m:t>𝑊</m:t>
+                            <m:t>𝑉</m:t>
                           </m:r>
                         </m:e>
                         <m:sup>
@@ -18796,7 +19495,7 @@
                     <a:latin typeface="+mn-lt"/>
                     <a:cs typeface="Segoe UI" panose="020B0502040204020203" pitchFamily="34" charset="0"/>
                   </a:rPr>
-                  <a:t> or</a:t>
+                  <a:t> or </a:t>
                 </a:r>
                 <a14:m>
                   <m:oMath xmlns:m="http://schemas.openxmlformats.org/officeDocument/2006/math">
@@ -19259,7 +19958,7 @@
             </p:txBody>
           </p:sp>
         </mc:Choice>
-        <mc:Fallback xmlns="">
+        <mc:Fallback>
           <p:sp>
             <p:nvSpPr>
               <p:cNvPr id="3" name="Content Placeholder 2">
@@ -19313,6 +20012,227 @@
   <p:clrMapOvr>
     <a:masterClrMapping/>
   </p:clrMapOvr>
+  <p:timing>
+    <p:tnLst>
+      <p:par>
+        <p:cTn id="1" dur="indefinite" restart="never" nodeType="tmRoot">
+          <p:childTnLst>
+            <p:seq concurrent="1" nextAc="seek">
+              <p:cTn id="2" dur="indefinite" nodeType="mainSeq">
+                <p:childTnLst>
+                  <p:par>
+                    <p:cTn id="3" fill="hold">
+                      <p:stCondLst>
+                        <p:cond delay="indefinite"/>
+                      </p:stCondLst>
+                      <p:childTnLst>
+                        <p:par>
+                          <p:cTn id="4" fill="hold">
+                            <p:stCondLst>
+                              <p:cond delay="0"/>
+                            </p:stCondLst>
+                            <p:childTnLst>
+                              <p:par>
+                                <p:cTn id="5" presetID="1" presetClass="entr" presetSubtype="0" fill="hold" nodeType="clickEffect">
+                                  <p:stCondLst>
+                                    <p:cond delay="0"/>
+                                  </p:stCondLst>
+                                  <p:childTnLst>
+                                    <p:set>
+                                      <p:cBhvr>
+                                        <p:cTn id="6" dur="1" fill="hold">
+                                          <p:stCondLst>
+                                            <p:cond delay="0"/>
+                                          </p:stCondLst>
+                                        </p:cTn>
+                                        <p:tgtEl>
+                                          <p:spTgt spid="3">
+                                            <p:txEl>
+                                              <p:pRg st="1" end="1"/>
+                                            </p:txEl>
+                                          </p:spTgt>
+                                        </p:tgtEl>
+                                        <p:attrNameLst>
+                                          <p:attrName>style.visibility</p:attrName>
+                                        </p:attrNameLst>
+                                      </p:cBhvr>
+                                      <p:to>
+                                        <p:strVal val="visible"/>
+                                      </p:to>
+                                    </p:set>
+                                  </p:childTnLst>
+                                </p:cTn>
+                              </p:par>
+                              <p:par>
+                                <p:cTn id="7" presetID="1" presetClass="entr" presetSubtype="0" fill="hold" nodeType="withEffect">
+                                  <p:stCondLst>
+                                    <p:cond delay="0"/>
+                                  </p:stCondLst>
+                                  <p:childTnLst>
+                                    <p:set>
+                                      <p:cBhvr>
+                                        <p:cTn id="8" dur="1" fill="hold">
+                                          <p:stCondLst>
+                                            <p:cond delay="0"/>
+                                          </p:stCondLst>
+                                        </p:cTn>
+                                        <p:tgtEl>
+                                          <p:spTgt spid="3">
+                                            <p:txEl>
+                                              <p:pRg st="3" end="3"/>
+                                            </p:txEl>
+                                          </p:spTgt>
+                                        </p:tgtEl>
+                                        <p:attrNameLst>
+                                          <p:attrName>style.visibility</p:attrName>
+                                        </p:attrNameLst>
+                                      </p:cBhvr>
+                                      <p:to>
+                                        <p:strVal val="visible"/>
+                                      </p:to>
+                                    </p:set>
+                                  </p:childTnLst>
+                                </p:cTn>
+                              </p:par>
+                            </p:childTnLst>
+                          </p:cTn>
+                        </p:par>
+                      </p:childTnLst>
+                    </p:cTn>
+                  </p:par>
+                  <p:par>
+                    <p:cTn id="9" fill="hold">
+                      <p:stCondLst>
+                        <p:cond delay="indefinite"/>
+                      </p:stCondLst>
+                      <p:childTnLst>
+                        <p:par>
+                          <p:cTn id="10" fill="hold">
+                            <p:stCondLst>
+                              <p:cond delay="0"/>
+                            </p:stCondLst>
+                            <p:childTnLst>
+                              <p:par>
+                                <p:cTn id="11" presetID="1" presetClass="entr" presetSubtype="0" fill="hold" nodeType="clickEffect">
+                                  <p:stCondLst>
+                                    <p:cond delay="0"/>
+                                  </p:stCondLst>
+                                  <p:childTnLst>
+                                    <p:set>
+                                      <p:cBhvr>
+                                        <p:cTn id="12" dur="1" fill="hold">
+                                          <p:stCondLst>
+                                            <p:cond delay="0"/>
+                                          </p:stCondLst>
+                                        </p:cTn>
+                                        <p:tgtEl>
+                                          <p:spTgt spid="3">
+                                            <p:txEl>
+                                              <p:pRg st="4" end="4"/>
+                                            </p:txEl>
+                                          </p:spTgt>
+                                        </p:tgtEl>
+                                        <p:attrNameLst>
+                                          <p:attrName>style.visibility</p:attrName>
+                                        </p:attrNameLst>
+                                      </p:cBhvr>
+                                      <p:to>
+                                        <p:strVal val="visible"/>
+                                      </p:to>
+                                    </p:set>
+                                  </p:childTnLst>
+                                </p:cTn>
+                              </p:par>
+                              <p:par>
+                                <p:cTn id="13" presetID="1" presetClass="entr" presetSubtype="0" fill="hold" nodeType="withEffect">
+                                  <p:stCondLst>
+                                    <p:cond delay="0"/>
+                                  </p:stCondLst>
+                                  <p:childTnLst>
+                                    <p:set>
+                                      <p:cBhvr>
+                                        <p:cTn id="14" dur="1" fill="hold">
+                                          <p:stCondLst>
+                                            <p:cond delay="0"/>
+                                          </p:stCondLst>
+                                        </p:cTn>
+                                        <p:tgtEl>
+                                          <p:spTgt spid="3">
+                                            <p:txEl>
+                                              <p:pRg st="5" end="5"/>
+                                            </p:txEl>
+                                          </p:spTgt>
+                                        </p:tgtEl>
+                                        <p:attrNameLst>
+                                          <p:attrName>style.visibility</p:attrName>
+                                        </p:attrNameLst>
+                                      </p:cBhvr>
+                                      <p:to>
+                                        <p:strVal val="visible"/>
+                                      </p:to>
+                                    </p:set>
+                                  </p:childTnLst>
+                                </p:cTn>
+                              </p:par>
+                              <p:par>
+                                <p:cTn id="15" presetID="1" presetClass="entr" presetSubtype="0" fill="hold" nodeType="withEffect">
+                                  <p:stCondLst>
+                                    <p:cond delay="0"/>
+                                  </p:stCondLst>
+                                  <p:childTnLst>
+                                    <p:set>
+                                      <p:cBhvr>
+                                        <p:cTn id="16" dur="1" fill="hold">
+                                          <p:stCondLst>
+                                            <p:cond delay="0"/>
+                                          </p:stCondLst>
+                                        </p:cTn>
+                                        <p:tgtEl>
+                                          <p:spTgt spid="3">
+                                            <p:txEl>
+                                              <p:pRg st="6" end="6"/>
+                                            </p:txEl>
+                                          </p:spTgt>
+                                        </p:tgtEl>
+                                        <p:attrNameLst>
+                                          <p:attrName>style.visibility</p:attrName>
+                                        </p:attrNameLst>
+                                      </p:cBhvr>
+                                      <p:to>
+                                        <p:strVal val="visible"/>
+                                      </p:to>
+                                    </p:set>
+                                  </p:childTnLst>
+                                </p:cTn>
+                              </p:par>
+                            </p:childTnLst>
+                          </p:cTn>
+                        </p:par>
+                      </p:childTnLst>
+                    </p:cTn>
+                  </p:par>
+                </p:childTnLst>
+              </p:cTn>
+              <p:prevCondLst>
+                <p:cond evt="onPrev" delay="0">
+                  <p:tgtEl>
+                    <p:sldTgt/>
+                  </p:tgtEl>
+                </p:cond>
+              </p:prevCondLst>
+              <p:nextCondLst>
+                <p:cond evt="onNext" delay="0">
+                  <p:tgtEl>
+                    <p:sldTgt/>
+                  </p:tgtEl>
+                </p:cond>
+              </p:nextCondLst>
+            </p:seq>
+          </p:childTnLst>
+        </p:cTn>
+      </p:par>
+    </p:tnLst>
+  </p:timing>
 </p:sld>
 </file>
 
@@ -26861,33 +27781,15 @@
                                   </p:childTnLst>
                                 </p:cTn>
                               </p:par>
-                            </p:childTnLst>
-                          </p:cTn>
-                        </p:par>
-                      </p:childTnLst>
-                    </p:cTn>
-                  </p:par>
-                  <p:par>
-                    <p:cTn id="57" fill="hold">
-                      <p:stCondLst>
-                        <p:cond delay="indefinite"/>
-                      </p:stCondLst>
-                      <p:childTnLst>
-                        <p:par>
-                          <p:cTn id="58" fill="hold">
-                            <p:stCondLst>
-                              <p:cond delay="0"/>
-                            </p:stCondLst>
-                            <p:childTnLst>
                               <p:par>
-                                <p:cTn id="59" presetID="1" presetClass="entr" presetSubtype="0" fill="hold" grpId="0" nodeType="clickEffect">
+                                <p:cTn id="57" presetID="1" presetClass="entr" presetSubtype="0" fill="hold" grpId="0" nodeType="withEffect">
                                   <p:stCondLst>
                                     <p:cond delay="0"/>
                                   </p:stCondLst>
                                   <p:childTnLst>
                                     <p:set>
                                       <p:cBhvr>
-                                        <p:cTn id="60" dur="1" fill="hold">
+                                        <p:cTn id="58" dur="1" fill="hold">
                                           <p:stCondLst>
                                             <p:cond delay="0"/>
                                           </p:stCondLst>
@@ -26907,14 +27809,14 @@
                                 </p:cTn>
                               </p:par>
                               <p:par>
-                                <p:cTn id="61" presetID="1" presetClass="entr" presetSubtype="0" fill="hold" nodeType="withEffect">
+                                <p:cTn id="59" presetID="1" presetClass="entr" presetSubtype="0" fill="hold" nodeType="withEffect">
                                   <p:stCondLst>
                                     <p:cond delay="0"/>
                                   </p:stCondLst>
                                   <p:childTnLst>
                                     <p:set>
                                       <p:cBhvr>
-                                        <p:cTn id="62" dur="1" fill="hold">
+                                        <p:cTn id="60" dur="1" fill="hold">
                                           <p:stCondLst>
                                             <p:cond delay="0"/>
                                           </p:stCondLst>
@@ -28303,8 +29205,8 @@
           </a:p>
         </p:txBody>
       </p:sp>
-      <mc:AlternateContent xmlns:mc="http://schemas.openxmlformats.org/markup-compatibility/2006" xmlns:a14="http://schemas.microsoft.com/office/drawing/2010/main">
-        <mc:Choice Requires="a14">
+      <mc:AlternateContent xmlns:mc="http://schemas.openxmlformats.org/markup-compatibility/2006">
+        <mc:Choice xmlns:a14="http://schemas.microsoft.com/office/drawing/2010/main" Requires="a14">
           <p:sp>
             <p:nvSpPr>
               <p:cNvPr id="3" name="Content Placeholder 2"/>
@@ -28498,7 +29400,7 @@
                   <a:rPr lang="en-US" dirty="0">
                     <a:latin typeface="+mn-lt"/>
                   </a:rPr>
-                  <a:t>parameter - d</a:t>
+                  <a:t>hyperparameter - d</a:t>
                 </a:r>
               </a:p>
               <a:p>
@@ -28692,7 +29594,7 @@
                     <a:latin typeface="+mn-lt"/>
                     <a:ea typeface="Cambria Math" panose="02040503050406030204" pitchFamily="18" charset="0"/>
                   </a:rPr>
-                  <a:t>parameter - </a:t>
+                  <a:t>hyperparameter - </a:t>
                 </a:r>
                 <a:r>
                   <a:rPr lang="en-US" b="0" i="1" dirty="0">
@@ -28914,7 +29816,7 @@
                   <a:rPr lang="en-US" b="0" dirty="0">
                     <a:latin typeface="+mn-lt"/>
                   </a:rPr>
-                  <a:t>parameters – </a:t>
+                  <a:t>hyperparameters – </a:t>
                 </a:r>
                 <a:r>
                   <a:rPr lang="en-US" b="0" dirty="0">
@@ -28951,7 +29853,7 @@
             </p:txBody>
           </p:sp>
         </mc:Choice>
-        <mc:Fallback xmlns="">
+        <mc:Fallback>
           <p:sp>
             <p:nvSpPr>
               <p:cNvPr id="3" name="Content Placeholder 2"/>
@@ -28999,6 +29901,183 @@
   <p:clrMapOvr>
     <a:masterClrMapping/>
   </p:clrMapOvr>
+  <p:timing>
+    <p:tnLst>
+      <p:par>
+        <p:cTn id="1" dur="indefinite" restart="never" nodeType="tmRoot">
+          <p:childTnLst>
+            <p:seq concurrent="1" nextAc="seek">
+              <p:cTn id="2" dur="indefinite" nodeType="mainSeq">
+                <p:childTnLst>
+                  <p:par>
+                    <p:cTn id="3" fill="hold">
+                      <p:stCondLst>
+                        <p:cond delay="indefinite"/>
+                      </p:stCondLst>
+                      <p:childTnLst>
+                        <p:par>
+                          <p:cTn id="4" fill="hold">
+                            <p:stCondLst>
+                              <p:cond delay="0"/>
+                            </p:stCondLst>
+                            <p:childTnLst>
+                              <p:par>
+                                <p:cTn id="5" presetID="1" presetClass="entr" presetSubtype="0" fill="hold" nodeType="clickEffect">
+                                  <p:stCondLst>
+                                    <p:cond delay="0"/>
+                                  </p:stCondLst>
+                                  <p:childTnLst>
+                                    <p:set>
+                                      <p:cBhvr>
+                                        <p:cTn id="6" dur="1" fill="hold">
+                                          <p:stCondLst>
+                                            <p:cond delay="0"/>
+                                          </p:stCondLst>
+                                        </p:cTn>
+                                        <p:tgtEl>
+                                          <p:spTgt spid="3">
+                                            <p:txEl>
+                                              <p:pRg st="1" end="1"/>
+                                            </p:txEl>
+                                          </p:spTgt>
+                                        </p:tgtEl>
+                                        <p:attrNameLst>
+                                          <p:attrName>style.visibility</p:attrName>
+                                        </p:attrNameLst>
+                                      </p:cBhvr>
+                                      <p:to>
+                                        <p:strVal val="visible"/>
+                                      </p:to>
+                                    </p:set>
+                                  </p:childTnLst>
+                                </p:cTn>
+                              </p:par>
+                            </p:childTnLst>
+                          </p:cTn>
+                        </p:par>
+                      </p:childTnLst>
+                    </p:cTn>
+                  </p:par>
+                  <p:par>
+                    <p:cTn id="7" fill="hold">
+                      <p:stCondLst>
+                        <p:cond delay="indefinite"/>
+                      </p:stCondLst>
+                      <p:childTnLst>
+                        <p:par>
+                          <p:cTn id="8" fill="hold">
+                            <p:stCondLst>
+                              <p:cond delay="0"/>
+                            </p:stCondLst>
+                            <p:childTnLst>
+                              <p:par>
+                                <p:cTn id="9" presetID="1" presetClass="entr" presetSubtype="0" fill="hold" nodeType="clickEffect">
+                                  <p:stCondLst>
+                                    <p:cond delay="0"/>
+                                  </p:stCondLst>
+                                  <p:childTnLst>
+                                    <p:set>
+                                      <p:cBhvr>
+                                        <p:cTn id="10" dur="1" fill="hold">
+                                          <p:stCondLst>
+                                            <p:cond delay="0"/>
+                                          </p:stCondLst>
+                                        </p:cTn>
+                                        <p:tgtEl>
+                                          <p:spTgt spid="3">
+                                            <p:txEl>
+                                              <p:pRg st="2" end="2"/>
+                                            </p:txEl>
+                                          </p:spTgt>
+                                        </p:tgtEl>
+                                        <p:attrNameLst>
+                                          <p:attrName>style.visibility</p:attrName>
+                                        </p:attrNameLst>
+                                      </p:cBhvr>
+                                      <p:to>
+                                        <p:strVal val="visible"/>
+                                      </p:to>
+                                    </p:set>
+                                  </p:childTnLst>
+                                </p:cTn>
+                              </p:par>
+                            </p:childTnLst>
+                          </p:cTn>
+                        </p:par>
+                      </p:childTnLst>
+                    </p:cTn>
+                  </p:par>
+                  <p:par>
+                    <p:cTn id="11" fill="hold">
+                      <p:stCondLst>
+                        <p:cond delay="indefinite"/>
+                      </p:stCondLst>
+                      <p:childTnLst>
+                        <p:par>
+                          <p:cTn id="12" fill="hold">
+                            <p:stCondLst>
+                              <p:cond delay="0"/>
+                            </p:stCondLst>
+                            <p:childTnLst>
+                              <p:par>
+                                <p:cTn id="13" presetID="1" presetClass="entr" presetSubtype="0" fill="hold" nodeType="clickEffect">
+                                  <p:stCondLst>
+                                    <p:cond delay="0"/>
+                                  </p:stCondLst>
+                                  <p:childTnLst>
+                                    <p:set>
+                                      <p:cBhvr>
+                                        <p:cTn id="14" dur="1" fill="hold">
+                                          <p:stCondLst>
+                                            <p:cond delay="0"/>
+                                          </p:stCondLst>
+                                        </p:cTn>
+                                        <p:tgtEl>
+                                          <p:spTgt spid="3">
+                                            <p:txEl>
+                                              <p:pRg st="3" end="3"/>
+                                            </p:txEl>
+                                          </p:spTgt>
+                                        </p:tgtEl>
+                                        <p:attrNameLst>
+                                          <p:attrName>style.visibility</p:attrName>
+                                        </p:attrNameLst>
+                                      </p:cBhvr>
+                                      <p:to>
+                                        <p:strVal val="visible"/>
+                                      </p:to>
+                                    </p:set>
+                                  </p:childTnLst>
+                                </p:cTn>
+                              </p:par>
+                            </p:childTnLst>
+                          </p:cTn>
+                        </p:par>
+                      </p:childTnLst>
+                    </p:cTn>
+                  </p:par>
+                </p:childTnLst>
+              </p:cTn>
+              <p:prevCondLst>
+                <p:cond evt="onPrev" delay="0">
+                  <p:tgtEl>
+                    <p:sldTgt/>
+                  </p:tgtEl>
+                </p:cond>
+              </p:prevCondLst>
+              <p:nextCondLst>
+                <p:cond evt="onNext" delay="0">
+                  <p:tgtEl>
+                    <p:sldTgt/>
+                  </p:tgtEl>
+                </p:cond>
+              </p:nextCondLst>
+            </p:seq>
+          </p:childTnLst>
+        </p:cTn>
+      </p:par>
+    </p:tnLst>
+  </p:timing>
 </p:sld>
 </file>
 
@@ -30884,8 +31963,8 @@
           </a:p>
         </p:txBody>
       </p:sp>
-      <mc:AlternateContent xmlns:mc="http://schemas.openxmlformats.org/markup-compatibility/2006" xmlns:a14="http://schemas.microsoft.com/office/drawing/2010/main">
-        <mc:Choice Requires="a14">
+      <mc:AlternateContent xmlns:mc="http://schemas.openxmlformats.org/markup-compatibility/2006">
+        <mc:Choice xmlns:a14="http://schemas.microsoft.com/office/drawing/2010/main" Requires="a14">
           <p:sp>
             <p:nvSpPr>
               <p:cNvPr id="3" name="Content Placeholder 2"/>
@@ -30904,7 +31983,7 @@
             </p:spPr>
             <p:txBody>
               <a:bodyPr>
-                <a:normAutofit lnSpcReduction="10000"/>
+                <a:normAutofit fontScale="92500" lnSpcReduction="20000"/>
               </a:bodyPr>
               <a:lstStyle/>
               <a:p>
@@ -30936,13 +32015,48 @@
                       <m:jc m:val="centerGroup"/>
                     </m:oMathParaPr>
                     <m:oMath xmlns:m="http://schemas.openxmlformats.org/officeDocument/2006/math">
-                      <m:r>
-                        <a:rPr lang="en-US" i="1">
-                          <a:latin typeface="Cambria Math" panose="02040503050406030204" pitchFamily="18" charset="0"/>
-                          <a:cs typeface="Segoe UI" panose="020B0502040204020203" pitchFamily="34" charset="0"/>
-                        </a:rPr>
-                        <m:t>𝑇</m:t>
-                      </m:r>
+                      <m:sSup>
+                        <m:sSupPr>
+                          <m:ctrlPr>
+                            <a:rPr lang="en-US" i="1">
+                              <a:latin typeface="Cambria Math" panose="02040503050406030204" pitchFamily="18" charset="0"/>
+                              <a:cs typeface="Segoe UI" panose="020B0502040204020203" pitchFamily="34" charset="0"/>
+                            </a:rPr>
+                          </m:ctrlPr>
+                        </m:sSupPr>
+                        <m:e>
+                          <m:r>
+                            <a:rPr lang="en-US" i="1">
+                              <a:latin typeface="Cambria Math" panose="02040503050406030204" pitchFamily="18" charset="0"/>
+                              <a:cs typeface="Segoe UI" panose="020B0502040204020203" pitchFamily="34" charset="0"/>
+                            </a:rPr>
+                            <m:t>𝑇</m:t>
+                          </m:r>
+                        </m:e>
+                        <m:sup>
+                          <m:r>
+                            <a:rPr lang="en-US" i="1">
+                              <a:latin typeface="Cambria Math" panose="02040503050406030204" pitchFamily="18" charset="0"/>
+                              <a:cs typeface="Segoe UI" panose="020B0502040204020203" pitchFamily="34" charset="0"/>
+                            </a:rPr>
+                            <m:t>(</m:t>
+                          </m:r>
+                          <m:r>
+                            <a:rPr lang="en-US" i="1">
+                              <a:latin typeface="Cambria Math" panose="02040503050406030204" pitchFamily="18" charset="0"/>
+                              <a:cs typeface="Segoe UI" panose="020B0502040204020203" pitchFamily="34" charset="0"/>
+                            </a:rPr>
+                            <m:t>𝑙</m:t>
+                          </m:r>
+                          <m:r>
+                            <a:rPr lang="en-US" i="1">
+                              <a:latin typeface="Cambria Math" panose="02040503050406030204" pitchFamily="18" charset="0"/>
+                              <a:cs typeface="Segoe UI" panose="020B0502040204020203" pitchFamily="34" charset="0"/>
+                            </a:rPr>
+                            <m:t>)</m:t>
+                          </m:r>
+                        </m:sup>
+                      </m:sSup>
                       <m:r>
                         <a:rPr lang="en-US" i="1">
                           <a:latin typeface="Cambria Math" panose="02040503050406030204" pitchFamily="18" charset="0"/>
@@ -30951,75 +32065,98 @@
                         <m:t>=</m:t>
                       </m:r>
                       <m:r>
-                        <a:rPr lang="en-US" b="0" i="1" smtClean="0">
+                        <a:rPr lang="en-US" i="1">
                           <a:latin typeface="Cambria Math" panose="02040503050406030204" pitchFamily="18" charset="0"/>
                           <a:cs typeface="Segoe UI" panose="020B0502040204020203" pitchFamily="34" charset="0"/>
                         </a:rPr>
-                        <m:t>𝑓</m:t>
+                        <m:t>𝑋</m:t>
                       </m:r>
-                      <m:d>
-                        <m:dPr>
+                      <m:sSup>
+                        <m:sSupPr>
                           <m:ctrlPr>
-                            <a:rPr lang="en-US" b="0" i="1" smtClean="0">
+                            <a:rPr lang="en-US" i="1">
                               <a:latin typeface="Cambria Math" panose="02040503050406030204" pitchFamily="18" charset="0"/>
                               <a:cs typeface="Segoe UI" panose="020B0502040204020203" pitchFamily="34" charset="0"/>
                             </a:rPr>
                           </m:ctrlPr>
-                        </m:dPr>
+                        </m:sSupPr>
                         <m:e>
                           <m:r>
                             <a:rPr lang="en-US" i="1">
                               <a:latin typeface="Cambria Math" panose="02040503050406030204" pitchFamily="18" charset="0"/>
                               <a:cs typeface="Segoe UI" panose="020B0502040204020203" pitchFamily="34" charset="0"/>
                             </a:rPr>
-                            <m:t>𝑋</m:t>
+                            <m:t>𝑊</m:t>
                           </m:r>
                         </m:e>
-                      </m:d>
+                        <m:sup>
+                          <m:r>
+                            <a:rPr lang="en-US" i="1">
+                              <a:latin typeface="Cambria Math" panose="02040503050406030204" pitchFamily="18" charset="0"/>
+                              <a:cs typeface="Segoe UI" panose="020B0502040204020203" pitchFamily="34" charset="0"/>
+                            </a:rPr>
+                            <m:t>(</m:t>
+                          </m:r>
+                          <m:r>
+                            <a:rPr lang="en-US" i="1">
+                              <a:latin typeface="Cambria Math" panose="02040503050406030204" pitchFamily="18" charset="0"/>
+                              <a:cs typeface="Segoe UI" panose="020B0502040204020203" pitchFamily="34" charset="0"/>
+                            </a:rPr>
+                            <m:t>𝑙</m:t>
+                          </m:r>
+                          <m:r>
+                            <a:rPr lang="en-US" i="1">
+                              <a:latin typeface="Cambria Math" panose="02040503050406030204" pitchFamily="18" charset="0"/>
+                              <a:cs typeface="Segoe UI" panose="020B0502040204020203" pitchFamily="34" charset="0"/>
+                            </a:rPr>
+                            <m:t>)</m:t>
+                          </m:r>
+                        </m:sup>
+                      </m:sSup>
                       <m:r>
-                        <a:rPr lang="en-US" b="0" i="1" smtClean="0">
+                        <a:rPr lang="en-US" i="1">
                           <a:latin typeface="Cambria Math" panose="02040503050406030204" pitchFamily="18" charset="0"/>
                           <a:cs typeface="Segoe UI" panose="020B0502040204020203" pitchFamily="34" charset="0"/>
                         </a:rPr>
                         <m:t> </m:t>
                       </m:r>
                       <m:r>
-                        <a:rPr lang="en-US" b="0" i="1" smtClean="0">
+                        <a:rPr lang="en-US" i="1">
                           <a:latin typeface="Cambria Math" panose="02040503050406030204" pitchFamily="18" charset="0"/>
                           <a:cs typeface="Segoe UI" panose="020B0502040204020203" pitchFamily="34" charset="0"/>
                         </a:rPr>
                         <m:t>𝑓𝑜𝑟</m:t>
                       </m:r>
                       <m:r>
-                        <a:rPr lang="en-US" b="0" i="1" smtClean="0">
+                        <a:rPr lang="en-US" i="1">
                           <a:latin typeface="Cambria Math" panose="02040503050406030204" pitchFamily="18" charset="0"/>
                           <a:cs typeface="Segoe UI" panose="020B0502040204020203" pitchFamily="34" charset="0"/>
                         </a:rPr>
                         <m:t> </m:t>
                       </m:r>
                       <m:r>
-                        <a:rPr lang="en-US" b="0" i="1" smtClean="0">
+                        <a:rPr lang="en-US" i="1">
                           <a:latin typeface="Cambria Math" panose="02040503050406030204" pitchFamily="18" charset="0"/>
                           <a:cs typeface="Segoe UI" panose="020B0502040204020203" pitchFamily="34" charset="0"/>
                         </a:rPr>
                         <m:t>𝑋</m:t>
                       </m:r>
                       <m:r>
-                        <a:rPr lang="en-US" b="0" i="1" smtClean="0">
+                        <a:rPr lang="en-US" i="1">
                           <a:latin typeface="Cambria Math" panose="02040503050406030204" pitchFamily="18" charset="0"/>
                           <a:cs typeface="Segoe UI" panose="020B0502040204020203" pitchFamily="34" charset="0"/>
                         </a:rPr>
                         <m:t> </m:t>
                       </m:r>
                       <m:r>
-                        <a:rPr lang="en-US" b="0" i="1" smtClean="0">
+                        <a:rPr lang="en-US" i="1">
                           <a:latin typeface="Cambria Math" panose="02040503050406030204" pitchFamily="18" charset="0"/>
                           <a:cs typeface="Segoe UI" panose="020B0502040204020203" pitchFamily="34" charset="0"/>
                         </a:rPr>
                         <m:t>𝑖𝑛</m:t>
                       </m:r>
                       <m:r>
-                        <a:rPr lang="en-US" b="0" i="1" smtClean="0">
+                        <a:rPr lang="en-US" i="1">
                           <a:latin typeface="Cambria Math" panose="02040503050406030204" pitchFamily="18" charset="0"/>
                           <a:cs typeface="Segoe UI" panose="020B0502040204020203" pitchFamily="34" charset="0"/>
                         </a:rPr>
@@ -31028,7 +32165,7 @@
                       <m:sSup>
                         <m:sSupPr>
                           <m:ctrlPr>
-                            <a:rPr lang="en-US" b="0" i="1" smtClean="0">
+                            <a:rPr lang="en-US" i="1">
                               <a:latin typeface="Cambria Math" panose="02040503050406030204" pitchFamily="18" charset="0"/>
                               <a:cs typeface="Segoe UI" panose="020B0502040204020203" pitchFamily="34" charset="0"/>
                             </a:rPr>
@@ -31036,7 +32173,7 @@
                         </m:sSupPr>
                         <m:e>
                           <m:r>
-                            <a:rPr lang="en-US" b="0" i="1" smtClean="0">
+                            <a:rPr lang="en-US" i="1">
                               <a:latin typeface="Cambria Math" panose="02040503050406030204" pitchFamily="18" charset="0"/>
                               <a:ea typeface="Cambria Math" panose="02040503050406030204" pitchFamily="18" charset="0"/>
                               <a:cs typeface="Segoe UI" panose="020B0502040204020203" pitchFamily="34" charset="0"/>
@@ -31046,7 +32183,7 @@
                         </m:e>
                         <m:sup>
                           <m:r>
-                            <a:rPr lang="en-US" b="0" i="1" smtClean="0">
+                            <a:rPr lang="en-US" i="1">
                               <a:latin typeface="Cambria Math" panose="02040503050406030204" pitchFamily="18" charset="0"/>
                               <a:cs typeface="Segoe UI" panose="020B0502040204020203" pitchFamily="34" charset="0"/>
                             </a:rPr>
@@ -31055,35 +32192,70 @@
                         </m:sup>
                       </m:sSup>
                       <m:r>
-                        <a:rPr lang="en-US" b="0" i="1" smtClean="0">
+                        <a:rPr lang="en-US" i="1">
+                          <a:latin typeface="Cambria Math" panose="02040503050406030204" pitchFamily="18" charset="0"/>
+                          <a:cs typeface="Segoe UI" panose="020B0502040204020203" pitchFamily="34" charset="0"/>
+                        </a:rPr>
+                        <m:t>,</m:t>
+                      </m:r>
+                      <m:sSup>
+                        <m:sSupPr>
+                          <m:ctrlPr>
+                            <a:rPr lang="en-US" i="1">
+                              <a:latin typeface="Cambria Math" panose="02040503050406030204" pitchFamily="18" charset="0"/>
+                              <a:cs typeface="Segoe UI" panose="020B0502040204020203" pitchFamily="34" charset="0"/>
+                            </a:rPr>
+                          </m:ctrlPr>
+                        </m:sSupPr>
+                        <m:e>
+                          <m:r>
+                            <a:rPr lang="en-US" i="1">
+                              <a:latin typeface="Cambria Math" panose="02040503050406030204" pitchFamily="18" charset="0"/>
+                              <a:cs typeface="Segoe UI" panose="020B0502040204020203" pitchFamily="34" charset="0"/>
+                            </a:rPr>
+                            <m:t>𝑇</m:t>
+                          </m:r>
+                        </m:e>
+                        <m:sup>
+                          <m:r>
+                            <a:rPr lang="en-US" i="1">
+                              <a:latin typeface="Cambria Math" panose="02040503050406030204" pitchFamily="18" charset="0"/>
+                              <a:cs typeface="Segoe UI" panose="020B0502040204020203" pitchFamily="34" charset="0"/>
+                            </a:rPr>
+                            <m:t>(</m:t>
+                          </m:r>
+                          <m:r>
+                            <a:rPr lang="en-US" i="1">
+                              <a:latin typeface="Cambria Math" panose="02040503050406030204" pitchFamily="18" charset="0"/>
+                              <a:cs typeface="Segoe UI" panose="020B0502040204020203" pitchFamily="34" charset="0"/>
+                            </a:rPr>
+                            <m:t>𝑙</m:t>
+                          </m:r>
+                          <m:r>
+                            <a:rPr lang="en-US" i="1">
+                              <a:latin typeface="Cambria Math" panose="02040503050406030204" pitchFamily="18" charset="0"/>
+                              <a:cs typeface="Segoe UI" panose="020B0502040204020203" pitchFamily="34" charset="0"/>
+                            </a:rPr>
+                            <m:t>)</m:t>
+                          </m:r>
+                        </m:sup>
+                      </m:sSup>
+                      <m:r>
+                        <a:rPr lang="en-US" i="1">
                           <a:latin typeface="Cambria Math" panose="02040503050406030204" pitchFamily="18" charset="0"/>
                           <a:cs typeface="Segoe UI" panose="020B0502040204020203" pitchFamily="34" charset="0"/>
                         </a:rPr>
                         <m:t> </m:t>
                       </m:r>
                       <m:r>
-                        <a:rPr lang="en-US" b="0" i="1" smtClean="0">
-                          <a:latin typeface="Cambria Math" panose="02040503050406030204" pitchFamily="18" charset="0"/>
-                          <a:cs typeface="Segoe UI" panose="020B0502040204020203" pitchFamily="34" charset="0"/>
-                        </a:rPr>
-                        <m:t>𝑇</m:t>
-                      </m:r>
-                      <m:r>
-                        <a:rPr lang="en-US" b="0" i="1" smtClean="0">
-                          <a:latin typeface="Cambria Math" panose="02040503050406030204" pitchFamily="18" charset="0"/>
-                          <a:cs typeface="Segoe UI" panose="020B0502040204020203" pitchFamily="34" charset="0"/>
-                        </a:rPr>
-                        <m:t> </m:t>
-                      </m:r>
-                      <m:r>
-                        <a:rPr lang="en-US" b="0" i="1" smtClean="0">
+                        <a:rPr lang="en-US" i="1">
                           <a:latin typeface="Cambria Math" panose="02040503050406030204" pitchFamily="18" charset="0"/>
                           <a:cs typeface="Segoe UI" panose="020B0502040204020203" pitchFamily="34" charset="0"/>
                         </a:rPr>
                         <m:t>𝑖𝑛</m:t>
                       </m:r>
                       <m:r>
-                        <a:rPr lang="en-US" b="0" i="1" smtClean="0">
+                        <a:rPr lang="en-US" i="1">
                           <a:latin typeface="Cambria Math" panose="02040503050406030204" pitchFamily="18" charset="0"/>
                           <a:cs typeface="Segoe UI" panose="020B0502040204020203" pitchFamily="34" charset="0"/>
                         </a:rPr>
@@ -31092,7 +32264,7 @@
                       <m:sSup>
                         <m:sSupPr>
                           <m:ctrlPr>
-                            <a:rPr lang="en-US" b="0" i="1" smtClean="0">
+                            <a:rPr lang="en-US" i="1">
                               <a:latin typeface="Cambria Math" panose="02040503050406030204" pitchFamily="18" charset="0"/>
                               <a:cs typeface="Segoe UI" panose="020B0502040204020203" pitchFamily="34" charset="0"/>
                             </a:rPr>
@@ -31100,7 +32272,7 @@
                         </m:sSupPr>
                         <m:e>
                           <m:r>
-                            <a:rPr lang="en-US" b="0" i="1" smtClean="0">
+                            <a:rPr lang="en-US" i="1">
                               <a:latin typeface="Cambria Math" panose="02040503050406030204" pitchFamily="18" charset="0"/>
                               <a:ea typeface="Cambria Math" panose="02040503050406030204" pitchFamily="18" charset="0"/>
                               <a:cs typeface="Segoe UI" panose="020B0502040204020203" pitchFamily="34" charset="0"/>
@@ -31110,45 +32282,61 @@
                         </m:e>
                         <m:sup>
                           <m:r>
-                            <a:rPr lang="en-US" b="0" i="1" smtClean="0">
+                            <a:rPr lang="en-US" i="1">
+                              <a:latin typeface="Cambria Math" panose="02040503050406030204" pitchFamily="18" charset="0"/>
+                              <a:ea typeface="Cambria Math" panose="02040503050406030204" pitchFamily="18" charset="0"/>
+                              <a:cs typeface="Segoe UI" panose="020B0502040204020203" pitchFamily="34" charset="0"/>
+                            </a:rPr>
+                            <m:t>(</m:t>
+                          </m:r>
+                          <m:r>
+                            <a:rPr lang="en-US" i="1">
                               <a:latin typeface="Cambria Math" panose="02040503050406030204" pitchFamily="18" charset="0"/>
                               <a:ea typeface="Cambria Math" panose="02040503050406030204" pitchFamily="18" charset="0"/>
                               <a:cs typeface="Segoe UI" panose="020B0502040204020203" pitchFamily="34" charset="0"/>
                             </a:rPr>
                             <m:t>𝑙</m:t>
                           </m:r>
+                          <m:r>
+                            <a:rPr lang="en-US" i="1">
+                              <a:latin typeface="Cambria Math" panose="02040503050406030204" pitchFamily="18" charset="0"/>
+                              <a:ea typeface="Cambria Math" panose="02040503050406030204" pitchFamily="18" charset="0"/>
+                              <a:cs typeface="Segoe UI" panose="020B0502040204020203" pitchFamily="34" charset="0"/>
+                            </a:rPr>
+                            <m:t>)</m:t>
+                          </m:r>
                         </m:sup>
                       </m:sSup>
                       <m:r>
-                        <a:rPr lang="en-US" b="0" i="1" smtClean="0">
+                        <a:rPr lang="en-US" i="1">
                           <a:latin typeface="Cambria Math" panose="02040503050406030204" pitchFamily="18" charset="0"/>
                           <a:cs typeface="Segoe UI" panose="020B0502040204020203" pitchFamily="34" charset="0"/>
                         </a:rPr>
                         <m:t>, </m:t>
                       </m:r>
                       <m:r>
-                        <a:rPr lang="en-US" b="0" i="1" smtClean="0">
+                        <a:rPr lang="en-US" i="1">
                           <a:latin typeface="Cambria Math" panose="02040503050406030204" pitchFamily="18" charset="0"/>
                           <a:cs typeface="Segoe UI" panose="020B0502040204020203" pitchFamily="34" charset="0"/>
                         </a:rPr>
                         <m:t>𝑝</m:t>
                       </m:r>
                       <m:r>
-                        <a:rPr lang="en-US" b="0" i="1" smtClean="0">
+                        <a:rPr lang="en-US" i="1">
                           <a:latin typeface="Cambria Math" panose="02040503050406030204" pitchFamily="18" charset="0"/>
                           <a:cs typeface="Segoe UI" panose="020B0502040204020203" pitchFamily="34" charset="0"/>
                         </a:rPr>
                         <m:t>&gt;</m:t>
                       </m:r>
                       <m:r>
-                        <a:rPr lang="en-US" b="0" i="1" smtClean="0">
+                        <a:rPr lang="en-US" i="1">
                           <a:latin typeface="Cambria Math" panose="02040503050406030204" pitchFamily="18" charset="0"/>
                           <a:cs typeface="Segoe UI" panose="020B0502040204020203" pitchFamily="34" charset="0"/>
                         </a:rPr>
                         <m:t>𝑙</m:t>
                       </m:r>
                       <m:r>
-                        <a:rPr lang="en-US" b="0" i="1" smtClean="0">
+                        <a:rPr lang="en-US" i="1">
                           <a:latin typeface="Cambria Math" panose="02040503050406030204" pitchFamily="18" charset="0"/>
                           <a:cs typeface="Segoe UI" panose="020B0502040204020203" pitchFamily="34" charset="0"/>
                         </a:rPr>
@@ -31167,13 +32355,110 @@
                   <a:rPr lang="en-US" dirty="0">
                     <a:latin typeface="+mn-lt"/>
                   </a:rPr>
-                  <a:t>A good more only if </a:t>
+                  <a:t>Minimizes reconstruction error only if </a:t>
                 </a:r>
                 <a:r>
                   <a:rPr lang="en-US" b="1" dirty="0">
                     <a:latin typeface="+mn-lt"/>
                   </a:rPr>
                   <a:t>kernel is good approximation of dependency between variables   </a:t>
+                </a:r>
+              </a:p>
+              <a:p>
+                <a:pPr lvl="1"/>
+                <a:r>
+                  <a:rPr lang="en-US" dirty="0">
+                    <a:latin typeface="+mn-lt"/>
+                  </a:rPr>
+                  <a:t>Weights, </a:t>
+                </a:r>
+                <a14:m>
+                  <m:oMath xmlns:m="http://schemas.openxmlformats.org/officeDocument/2006/math">
+                    <m:sSub>
+                      <m:sSubPr>
+                        <m:ctrlPr>
+                          <a:rPr lang="en-US" i="1">
+                            <a:latin typeface="Cambria Math" panose="02040503050406030204" pitchFamily="18" charset="0"/>
+                          </a:rPr>
+                        </m:ctrlPr>
+                      </m:sSubPr>
+                      <m:e>
+                        <m:r>
+                          <a:rPr lang="en-US" i="1">
+                            <a:latin typeface="Cambria Math" panose="02040503050406030204" pitchFamily="18" charset="0"/>
+                            <a:ea typeface="Cambria Math" panose="02040503050406030204" pitchFamily="18" charset="0"/>
+                          </a:rPr>
+                          <m:t>𝛼</m:t>
+                        </m:r>
+                      </m:e>
+                      <m:sub>
+                        <m:r>
+                          <a:rPr lang="en-US" i="1">
+                            <a:latin typeface="Cambria Math" panose="02040503050406030204" pitchFamily="18" charset="0"/>
+                          </a:rPr>
+                          <m:t>𝑖</m:t>
+                        </m:r>
+                      </m:sub>
+                    </m:sSub>
+                  </m:oMath>
+                </a14:m>
+                <a:r>
+                  <a:rPr lang="en-US" dirty="0">
+                    <a:latin typeface="+mn-lt"/>
+                  </a:rPr>
+                  <a:t>, to build </a:t>
+                </a:r>
+                <a14:m>
+                  <m:oMath xmlns:m="http://schemas.openxmlformats.org/officeDocument/2006/math">
+                    <m:sSup>
+                      <m:sSupPr>
+                        <m:ctrlPr>
+                          <a:rPr lang="en-US" i="1">
+                            <a:latin typeface="Cambria Math" panose="02040503050406030204" pitchFamily="18" charset="0"/>
+                            <a:cs typeface="Segoe UI" panose="020B0502040204020203" pitchFamily="34" charset="0"/>
+                          </a:rPr>
+                        </m:ctrlPr>
+                      </m:sSupPr>
+                      <m:e>
+                        <m:r>
+                          <a:rPr lang="en-US" i="1">
+                            <a:latin typeface="Cambria Math" panose="02040503050406030204" pitchFamily="18" charset="0"/>
+                            <a:cs typeface="Segoe UI" panose="020B0502040204020203" pitchFamily="34" charset="0"/>
+                          </a:rPr>
+                          <m:t>𝑊</m:t>
+                        </m:r>
+                      </m:e>
+                      <m:sup>
+                        <m:r>
+                          <a:rPr lang="en-US" i="1">
+                            <a:latin typeface="Cambria Math" panose="02040503050406030204" pitchFamily="18" charset="0"/>
+                            <a:cs typeface="Segoe UI" panose="020B0502040204020203" pitchFamily="34" charset="0"/>
+                          </a:rPr>
+                          <m:t>(</m:t>
+                        </m:r>
+                        <m:r>
+                          <a:rPr lang="en-US" i="1">
+                            <a:latin typeface="Cambria Math" panose="02040503050406030204" pitchFamily="18" charset="0"/>
+                            <a:cs typeface="Segoe UI" panose="020B0502040204020203" pitchFamily="34" charset="0"/>
+                          </a:rPr>
+                          <m:t>𝑙</m:t>
+                        </m:r>
+                        <m:r>
+                          <a:rPr lang="en-US" i="1">
+                            <a:latin typeface="Cambria Math" panose="02040503050406030204" pitchFamily="18" charset="0"/>
+                            <a:cs typeface="Segoe UI" panose="020B0502040204020203" pitchFamily="34" charset="0"/>
+                          </a:rPr>
+                          <m:t>)</m:t>
+                        </m:r>
+                      </m:sup>
+                    </m:sSup>
+                  </m:oMath>
+                </a14:m>
+                <a:r>
+                  <a:rPr lang="en-US" dirty="0">
+                    <a:latin typeface="+mn-lt"/>
+                  </a:rPr>
+                  <a:t> from basis functions are learned by minimizing least squares error  </a:t>
                 </a:r>
               </a:p>
               <a:p>
@@ -31187,7 +32472,7 @@
                   <a:rPr lang="en-US" b="1" dirty="0">
                     <a:latin typeface="+mn-lt"/>
                   </a:rPr>
-                  <a:t>minimizes least square error </a:t>
+                  <a:t>minimizes error </a:t>
                 </a:r>
                 <a:r>
                   <a:rPr lang="en-US" dirty="0">
@@ -31257,7 +32542,7 @@
             </p:txBody>
           </p:sp>
         </mc:Choice>
-        <mc:Fallback xmlns="">
+        <mc:Fallback>
           <p:sp>
             <p:nvSpPr>
               <p:cNvPr id="3" name="Content Placeholder 2"/>
@@ -31276,7 +32561,7 @@
               <a:blipFill>
                 <a:blip r:embed="rId3"/>
                 <a:stretch>
-                  <a:fillRect l="-1111" t="-2706" r="-1376"/>
+                  <a:fillRect l="-952" t="-2941" r="-635"/>
                 </a:stretch>
               </a:blipFill>
             </p:spPr>
@@ -31305,6 +32590,449 @@
   <p:clrMapOvr>
     <a:masterClrMapping/>
   </p:clrMapOvr>
+  <p:timing>
+    <p:tnLst>
+      <p:par>
+        <p:cTn id="1" dur="indefinite" restart="never" nodeType="tmRoot">
+          <p:childTnLst>
+            <p:seq concurrent="1" nextAc="seek">
+              <p:cTn id="2" dur="indefinite" nodeType="mainSeq">
+                <p:childTnLst>
+                  <p:par>
+                    <p:cTn id="3" fill="hold">
+                      <p:stCondLst>
+                        <p:cond delay="indefinite"/>
+                      </p:stCondLst>
+                      <p:childTnLst>
+                        <p:par>
+                          <p:cTn id="4" fill="hold">
+                            <p:stCondLst>
+                              <p:cond delay="0"/>
+                            </p:stCondLst>
+                            <p:childTnLst>
+                              <p:par>
+                                <p:cTn id="5" presetID="1" presetClass="entr" presetSubtype="0" fill="hold" nodeType="clickEffect">
+                                  <p:stCondLst>
+                                    <p:cond delay="0"/>
+                                  </p:stCondLst>
+                                  <p:childTnLst>
+                                    <p:set>
+                                      <p:cBhvr>
+                                        <p:cTn id="6" dur="1" fill="hold">
+                                          <p:stCondLst>
+                                            <p:cond delay="0"/>
+                                          </p:stCondLst>
+                                        </p:cTn>
+                                        <p:tgtEl>
+                                          <p:spTgt spid="3">
+                                            <p:txEl>
+                                              <p:pRg st="1" end="1"/>
+                                            </p:txEl>
+                                          </p:spTgt>
+                                        </p:tgtEl>
+                                        <p:attrNameLst>
+                                          <p:attrName>style.visibility</p:attrName>
+                                        </p:attrNameLst>
+                                      </p:cBhvr>
+                                      <p:to>
+                                        <p:strVal val="visible"/>
+                                      </p:to>
+                                    </p:set>
+                                  </p:childTnLst>
+                                </p:cTn>
+                              </p:par>
+                              <p:par>
+                                <p:cTn id="7" presetID="1" presetClass="entr" presetSubtype="0" fill="hold" nodeType="withEffect">
+                                  <p:stCondLst>
+                                    <p:cond delay="0"/>
+                                  </p:stCondLst>
+                                  <p:childTnLst>
+                                    <p:set>
+                                      <p:cBhvr>
+                                        <p:cTn id="8" dur="1" fill="hold">
+                                          <p:stCondLst>
+                                            <p:cond delay="0"/>
+                                          </p:stCondLst>
+                                        </p:cTn>
+                                        <p:tgtEl>
+                                          <p:spTgt spid="3">
+                                            <p:txEl>
+                                              <p:pRg st="2" end="2"/>
+                                            </p:txEl>
+                                          </p:spTgt>
+                                        </p:tgtEl>
+                                        <p:attrNameLst>
+                                          <p:attrName>style.visibility</p:attrName>
+                                        </p:attrNameLst>
+                                      </p:cBhvr>
+                                      <p:to>
+                                        <p:strVal val="visible"/>
+                                      </p:to>
+                                    </p:set>
+                                  </p:childTnLst>
+                                </p:cTn>
+                              </p:par>
+                              <p:par>
+                                <p:cTn id="9" presetID="1" presetClass="entr" presetSubtype="0" fill="hold" nodeType="withEffect">
+                                  <p:stCondLst>
+                                    <p:cond delay="0"/>
+                                  </p:stCondLst>
+                                  <p:childTnLst>
+                                    <p:set>
+                                      <p:cBhvr>
+                                        <p:cTn id="10" dur="1" fill="hold">
+                                          <p:stCondLst>
+                                            <p:cond delay="0"/>
+                                          </p:stCondLst>
+                                        </p:cTn>
+                                        <p:tgtEl>
+                                          <p:spTgt spid="3">
+                                            <p:txEl>
+                                              <p:pRg st="3" end="3"/>
+                                            </p:txEl>
+                                          </p:spTgt>
+                                        </p:tgtEl>
+                                        <p:attrNameLst>
+                                          <p:attrName>style.visibility</p:attrName>
+                                        </p:attrNameLst>
+                                      </p:cBhvr>
+                                      <p:to>
+                                        <p:strVal val="visible"/>
+                                      </p:to>
+                                    </p:set>
+                                  </p:childTnLst>
+                                </p:cTn>
+                              </p:par>
+                              <p:par>
+                                <p:cTn id="11" presetID="1" presetClass="entr" presetSubtype="0" fill="hold" nodeType="withEffect">
+                                  <p:stCondLst>
+                                    <p:cond delay="0"/>
+                                  </p:stCondLst>
+                                  <p:childTnLst>
+                                    <p:set>
+                                      <p:cBhvr>
+                                        <p:cTn id="12" dur="1" fill="hold">
+                                          <p:stCondLst>
+                                            <p:cond delay="0"/>
+                                          </p:stCondLst>
+                                        </p:cTn>
+                                        <p:tgtEl>
+                                          <p:spTgt spid="3">
+                                            <p:txEl>
+                                              <p:pRg st="4" end="4"/>
+                                            </p:txEl>
+                                          </p:spTgt>
+                                        </p:tgtEl>
+                                        <p:attrNameLst>
+                                          <p:attrName>style.visibility</p:attrName>
+                                        </p:attrNameLst>
+                                      </p:cBhvr>
+                                      <p:to>
+                                        <p:strVal val="visible"/>
+                                      </p:to>
+                                    </p:set>
+                                  </p:childTnLst>
+                                </p:cTn>
+                              </p:par>
+                            </p:childTnLst>
+                          </p:cTn>
+                        </p:par>
+                      </p:childTnLst>
+                    </p:cTn>
+                  </p:par>
+                  <p:par>
+                    <p:cTn id="13" fill="hold">
+                      <p:stCondLst>
+                        <p:cond delay="indefinite"/>
+                      </p:stCondLst>
+                      <p:childTnLst>
+                        <p:par>
+                          <p:cTn id="14" fill="hold">
+                            <p:stCondLst>
+                              <p:cond delay="0"/>
+                            </p:stCondLst>
+                            <p:childTnLst>
+                              <p:par>
+                                <p:cTn id="15" presetID="1" presetClass="entr" presetSubtype="0" fill="hold" nodeType="clickEffect">
+                                  <p:stCondLst>
+                                    <p:cond delay="0"/>
+                                  </p:stCondLst>
+                                  <p:childTnLst>
+                                    <p:set>
+                                      <p:cBhvr>
+                                        <p:cTn id="16" dur="1" fill="hold">
+                                          <p:stCondLst>
+                                            <p:cond delay="0"/>
+                                          </p:stCondLst>
+                                        </p:cTn>
+                                        <p:tgtEl>
+                                          <p:spTgt spid="3">
+                                            <p:txEl>
+                                              <p:pRg st="5" end="5"/>
+                                            </p:txEl>
+                                          </p:spTgt>
+                                        </p:tgtEl>
+                                        <p:attrNameLst>
+                                          <p:attrName>style.visibility</p:attrName>
+                                        </p:attrNameLst>
+                                      </p:cBhvr>
+                                      <p:to>
+                                        <p:strVal val="visible"/>
+                                      </p:to>
+                                    </p:set>
+                                  </p:childTnLst>
+                                </p:cTn>
+                              </p:par>
+                              <p:par>
+                                <p:cTn id="17" presetID="1" presetClass="entr" presetSubtype="0" fill="hold" nodeType="withEffect">
+                                  <p:stCondLst>
+                                    <p:cond delay="0"/>
+                                  </p:stCondLst>
+                                  <p:childTnLst>
+                                    <p:set>
+                                      <p:cBhvr>
+                                        <p:cTn id="18" dur="1" fill="hold">
+                                          <p:stCondLst>
+                                            <p:cond delay="0"/>
+                                          </p:stCondLst>
+                                        </p:cTn>
+                                        <p:tgtEl>
+                                          <p:spTgt spid="3">
+                                            <p:txEl>
+                                              <p:pRg st="6" end="6"/>
+                                            </p:txEl>
+                                          </p:spTgt>
+                                        </p:tgtEl>
+                                        <p:attrNameLst>
+                                          <p:attrName>style.visibility</p:attrName>
+                                        </p:attrNameLst>
+                                      </p:cBhvr>
+                                      <p:to>
+                                        <p:strVal val="visible"/>
+                                      </p:to>
+                                    </p:set>
+                                  </p:childTnLst>
+                                </p:cTn>
+                              </p:par>
+                              <p:par>
+                                <p:cTn id="19" presetID="1" presetClass="entr" presetSubtype="0" fill="hold" nodeType="withEffect">
+                                  <p:stCondLst>
+                                    <p:cond delay="0"/>
+                                  </p:stCondLst>
+                                  <p:childTnLst>
+                                    <p:set>
+                                      <p:cBhvr>
+                                        <p:cTn id="20" dur="1" fill="hold">
+                                          <p:stCondLst>
+                                            <p:cond delay="0"/>
+                                          </p:stCondLst>
+                                        </p:cTn>
+                                        <p:tgtEl>
+                                          <p:spTgt spid="3">
+                                            <p:txEl>
+                                              <p:pRg st="7" end="7"/>
+                                            </p:txEl>
+                                          </p:spTgt>
+                                        </p:tgtEl>
+                                        <p:attrNameLst>
+                                          <p:attrName>style.visibility</p:attrName>
+                                        </p:attrNameLst>
+                                      </p:cBhvr>
+                                      <p:to>
+                                        <p:strVal val="visible"/>
+                                      </p:to>
+                                    </p:set>
+                                  </p:childTnLst>
+                                </p:cTn>
+                              </p:par>
+                            </p:childTnLst>
+                          </p:cTn>
+                        </p:par>
+                      </p:childTnLst>
+                    </p:cTn>
+                  </p:par>
+                  <p:par>
+                    <p:cTn id="21" fill="hold">
+                      <p:stCondLst>
+                        <p:cond delay="indefinite"/>
+                      </p:stCondLst>
+                      <p:childTnLst>
+                        <p:par>
+                          <p:cTn id="22" fill="hold">
+                            <p:stCondLst>
+                              <p:cond delay="0"/>
+                            </p:stCondLst>
+                            <p:childTnLst>
+                              <p:par>
+                                <p:cTn id="23" presetID="1" presetClass="entr" presetSubtype="0" fill="hold" nodeType="clickEffect">
+                                  <p:stCondLst>
+                                    <p:cond delay="0"/>
+                                  </p:stCondLst>
+                                  <p:childTnLst>
+                                    <p:set>
+                                      <p:cBhvr>
+                                        <p:cTn id="24" dur="1" fill="hold">
+                                          <p:stCondLst>
+                                            <p:cond delay="0"/>
+                                          </p:stCondLst>
+                                        </p:cTn>
+                                        <p:tgtEl>
+                                          <p:spTgt spid="3">
+                                            <p:txEl>
+                                              <p:pRg st="8" end="8"/>
+                                            </p:txEl>
+                                          </p:spTgt>
+                                        </p:tgtEl>
+                                        <p:attrNameLst>
+                                          <p:attrName>style.visibility</p:attrName>
+                                        </p:attrNameLst>
+                                      </p:cBhvr>
+                                      <p:to>
+                                        <p:strVal val="visible"/>
+                                      </p:to>
+                                    </p:set>
+                                  </p:childTnLst>
+                                </p:cTn>
+                              </p:par>
+                              <p:par>
+                                <p:cTn id="25" presetID="1" presetClass="entr" presetSubtype="0" fill="hold" nodeType="withEffect">
+                                  <p:stCondLst>
+                                    <p:cond delay="0"/>
+                                  </p:stCondLst>
+                                  <p:childTnLst>
+                                    <p:set>
+                                      <p:cBhvr>
+                                        <p:cTn id="26" dur="1" fill="hold">
+                                          <p:stCondLst>
+                                            <p:cond delay="0"/>
+                                          </p:stCondLst>
+                                        </p:cTn>
+                                        <p:tgtEl>
+                                          <p:spTgt spid="3">
+                                            <p:txEl>
+                                              <p:pRg st="9" end="9"/>
+                                            </p:txEl>
+                                          </p:spTgt>
+                                        </p:tgtEl>
+                                        <p:attrNameLst>
+                                          <p:attrName>style.visibility</p:attrName>
+                                        </p:attrNameLst>
+                                      </p:cBhvr>
+                                      <p:to>
+                                        <p:strVal val="visible"/>
+                                      </p:to>
+                                    </p:set>
+                                  </p:childTnLst>
+                                </p:cTn>
+                              </p:par>
+                            </p:childTnLst>
+                          </p:cTn>
+                        </p:par>
+                      </p:childTnLst>
+                    </p:cTn>
+                  </p:par>
+                  <p:par>
+                    <p:cTn id="27" fill="hold">
+                      <p:stCondLst>
+                        <p:cond delay="indefinite"/>
+                      </p:stCondLst>
+                      <p:childTnLst>
+                        <p:par>
+                          <p:cTn id="28" fill="hold">
+                            <p:stCondLst>
+                              <p:cond delay="0"/>
+                            </p:stCondLst>
+                            <p:childTnLst>
+                              <p:par>
+                                <p:cTn id="29" presetID="1" presetClass="entr" presetSubtype="0" fill="hold" nodeType="clickEffect">
+                                  <p:stCondLst>
+                                    <p:cond delay="0"/>
+                                  </p:stCondLst>
+                                  <p:childTnLst>
+                                    <p:set>
+                                      <p:cBhvr>
+                                        <p:cTn id="30" dur="1" fill="hold">
+                                          <p:stCondLst>
+                                            <p:cond delay="0"/>
+                                          </p:stCondLst>
+                                        </p:cTn>
+                                        <p:tgtEl>
+                                          <p:spTgt spid="3">
+                                            <p:txEl>
+                                              <p:pRg st="10" end="10"/>
+                                            </p:txEl>
+                                          </p:spTgt>
+                                        </p:tgtEl>
+                                        <p:attrNameLst>
+                                          <p:attrName>style.visibility</p:attrName>
+                                        </p:attrNameLst>
+                                      </p:cBhvr>
+                                      <p:to>
+                                        <p:strVal val="visible"/>
+                                      </p:to>
+                                    </p:set>
+                                  </p:childTnLst>
+                                </p:cTn>
+                              </p:par>
+                              <p:par>
+                                <p:cTn id="31" presetID="1" presetClass="entr" presetSubtype="0" fill="hold" nodeType="withEffect">
+                                  <p:stCondLst>
+                                    <p:cond delay="0"/>
+                                  </p:stCondLst>
+                                  <p:childTnLst>
+                                    <p:set>
+                                      <p:cBhvr>
+                                        <p:cTn id="32" dur="1" fill="hold">
+                                          <p:stCondLst>
+                                            <p:cond delay="0"/>
+                                          </p:stCondLst>
+                                        </p:cTn>
+                                        <p:tgtEl>
+                                          <p:spTgt spid="3">
+                                            <p:txEl>
+                                              <p:pRg st="11" end="11"/>
+                                            </p:txEl>
+                                          </p:spTgt>
+                                        </p:tgtEl>
+                                        <p:attrNameLst>
+                                          <p:attrName>style.visibility</p:attrName>
+                                        </p:attrNameLst>
+                                      </p:cBhvr>
+                                      <p:to>
+                                        <p:strVal val="visible"/>
+                                      </p:to>
+                                    </p:set>
+                                  </p:childTnLst>
+                                </p:cTn>
+                              </p:par>
+                            </p:childTnLst>
+                          </p:cTn>
+                        </p:par>
+                      </p:childTnLst>
+                    </p:cTn>
+                  </p:par>
+                </p:childTnLst>
+              </p:cTn>
+              <p:prevCondLst>
+                <p:cond evt="onPrev" delay="0">
+                  <p:tgtEl>
+                    <p:sldTgt/>
+                  </p:tgtEl>
+                </p:cond>
+              </p:prevCondLst>
+              <p:nextCondLst>
+                <p:cond evt="onNext" delay="0">
+                  <p:tgtEl>
+                    <p:sldTgt/>
+                  </p:tgtEl>
+                </p:cond>
+              </p:nextCondLst>
+            </p:seq>
+          </p:childTnLst>
+        </p:cTn>
+      </p:par>
+    </p:tnLst>
+  </p:timing>
 </p:sld>
 </file>
 
@@ -31405,7 +33133,7 @@
               <a:rPr lang="en-US" dirty="0">
                 <a:latin typeface="+mn-lt"/>
               </a:rPr>
-              <a:t>Distances converge to the same size in a high dimensional space  </a:t>
+              <a:t>Distances converge to the same length in a high dimensional space  </a:t>
             </a:r>
           </a:p>
           <a:p>
@@ -32353,14 +34081,6 @@
                 <a:latin typeface="+mn-lt"/>
               </a:rPr>
               <a:t>Introduction to dimensionality reduction </a:t>
-            </a:r>
-          </a:p>
-          <a:p>
-            <a:r>
-              <a:rPr lang="en-US" dirty="0">
-                <a:latin typeface="+mn-lt"/>
-              </a:rPr>
-              <a:t>Review of eigenvalues and eigenvectors   </a:t>
             </a:r>
           </a:p>
           <a:p>
@@ -32815,7 +34535,7 @@
                       <a:rPr lang="en-US" b="0" i="1" smtClean="0">
                         <a:latin typeface="Cambria Math" panose="02040503050406030204" pitchFamily="18" charset="0"/>
                       </a:rPr>
-                      <m:t>𝑁</m:t>
+                      <m:t>𝑁𝑜𝑟𝑚𝑎𝑙</m:t>
                     </m:r>
                     <m:d>
                       <m:dPr>
@@ -33216,26 +34936,39 @@
                                   </p:childTnLst>
                                 </p:cTn>
                               </p:par>
-                            </p:childTnLst>
-                          </p:cTn>
-                        </p:par>
-                      </p:childTnLst>
-                    </p:cTn>
-                  </p:par>
-                  <p:par>
-                    <p:cTn id="13" fill="hold">
-                      <p:stCondLst>
-                        <p:cond delay="indefinite"/>
-                      </p:stCondLst>
-                      <p:childTnLst>
-                        <p:par>
-                          <p:cTn id="14" fill="hold">
-                            <p:stCondLst>
-                              <p:cond delay="0"/>
-                            </p:stCondLst>
-                            <p:childTnLst>
                               <p:par>
-                                <p:cTn id="15" presetID="1" presetClass="entr" presetSubtype="0" fill="hold" nodeType="clickEffect">
+                                <p:cTn id="13" presetID="1" presetClass="entr" presetSubtype="0" fill="hold" nodeType="withEffect">
+                                  <p:stCondLst>
+                                    <p:cond delay="0"/>
+                                  </p:stCondLst>
+                                  <p:childTnLst>
+                                    <p:set>
+                                      <p:cBhvr>
+                                        <p:cTn id="14" dur="1" fill="hold">
+                                          <p:stCondLst>
+                                            <p:cond delay="0"/>
+                                          </p:stCondLst>
+                                        </p:cTn>
+                                        <p:tgtEl>
+                                          <p:spTgt spid="3">
+                                            <p:txEl>
+                                              <p:pRg st="4" end="4"/>
+                                            </p:txEl>
+                                          </p:spTgt>
+                                        </p:tgtEl>
+                                        <p:attrNameLst>
+                                          <p:attrName>style.visibility</p:attrName>
+                                        </p:attrNameLst>
+                                      </p:cBhvr>
+                                      <p:to>
+                                        <p:strVal val="visible"/>
+                                      </p:to>
+                                    </p:set>
+                                  </p:childTnLst>
+                                </p:cTn>
+                              </p:par>
+                              <p:par>
+                                <p:cTn id="15" presetID="1" presetClass="entr" presetSubtype="0" fill="hold" nodeType="withEffect">
                                   <p:stCondLst>
                                     <p:cond delay="0"/>
                                   </p:stCondLst>
@@ -33250,7 +34983,7 @@
                                         <p:tgtEl>
                                           <p:spTgt spid="3">
                                             <p:txEl>
-                                              <p:pRg st="4" end="4"/>
+                                              <p:pRg st="5" end="5"/>
                                             </p:txEl>
                                           </p:spTgt>
                                         </p:tgtEl>
@@ -33281,37 +35014,6 @@
                                         <p:tgtEl>
                                           <p:spTgt spid="3">
                                             <p:txEl>
-                                              <p:pRg st="5" end="5"/>
-                                            </p:txEl>
-                                          </p:spTgt>
-                                        </p:tgtEl>
-                                        <p:attrNameLst>
-                                          <p:attrName>style.visibility</p:attrName>
-                                        </p:attrNameLst>
-                                      </p:cBhvr>
-                                      <p:to>
-                                        <p:strVal val="visible"/>
-                                      </p:to>
-                                    </p:set>
-                                  </p:childTnLst>
-                                </p:cTn>
-                              </p:par>
-                              <p:par>
-                                <p:cTn id="19" presetID="1" presetClass="entr" presetSubtype="0" fill="hold" nodeType="withEffect">
-                                  <p:stCondLst>
-                                    <p:cond delay="0"/>
-                                  </p:stCondLst>
-                                  <p:childTnLst>
-                                    <p:set>
-                                      <p:cBhvr>
-                                        <p:cTn id="20" dur="1" fill="hold">
-                                          <p:stCondLst>
-                                            <p:cond delay="0"/>
-                                          </p:stCondLst>
-                                        </p:cTn>
-                                        <p:tgtEl>
-                                          <p:spTgt spid="3">
-                                            <p:txEl>
                                               <p:pRg st="6" end="6"/>
                                             </p:txEl>
                                           </p:spTgt>
@@ -33334,26 +35036,26 @@
                     </p:cTn>
                   </p:par>
                   <p:par>
-                    <p:cTn id="21" fill="hold">
+                    <p:cTn id="19" fill="hold">
                       <p:stCondLst>
                         <p:cond delay="indefinite"/>
                       </p:stCondLst>
                       <p:childTnLst>
                         <p:par>
-                          <p:cTn id="22" fill="hold">
+                          <p:cTn id="20" fill="hold">
                             <p:stCondLst>
                               <p:cond delay="0"/>
                             </p:stCondLst>
                             <p:childTnLst>
                               <p:par>
-                                <p:cTn id="23" presetID="1" presetClass="entr" presetSubtype="0" fill="hold" nodeType="clickEffect">
+                                <p:cTn id="21" presetID="1" presetClass="entr" presetSubtype="0" fill="hold" nodeType="clickEffect">
                                   <p:stCondLst>
                                     <p:cond delay="0"/>
                                   </p:stCondLst>
                                   <p:childTnLst>
                                     <p:set>
                                       <p:cBhvr>
-                                        <p:cTn id="24" dur="1" fill="hold">
+                                        <p:cTn id="22" dur="1" fill="hold">
                                           <p:stCondLst>
                                             <p:cond delay="0"/>
                                           </p:stCondLst>
@@ -33383,26 +35085,26 @@
                     </p:cTn>
                   </p:par>
                   <p:par>
-                    <p:cTn id="25" fill="hold">
+                    <p:cTn id="23" fill="hold">
                       <p:stCondLst>
                         <p:cond delay="indefinite"/>
                       </p:stCondLst>
                       <p:childTnLst>
                         <p:par>
-                          <p:cTn id="26" fill="hold">
+                          <p:cTn id="24" fill="hold">
                             <p:stCondLst>
                               <p:cond delay="0"/>
                             </p:stCondLst>
                             <p:childTnLst>
                               <p:par>
-                                <p:cTn id="27" presetID="1" presetClass="entr" presetSubtype="0" fill="hold" nodeType="clickEffect">
+                                <p:cTn id="25" presetID="1" presetClass="entr" presetSubtype="0" fill="hold" nodeType="clickEffect">
                                   <p:stCondLst>
                                     <p:cond delay="0"/>
                                   </p:stCondLst>
                                   <p:childTnLst>
                                     <p:set>
                                       <p:cBhvr>
-                                        <p:cTn id="28" dur="1" fill="hold">
+                                        <p:cTn id="26" dur="1" fill="hold">
                                           <p:stCondLst>
                                             <p:cond delay="0"/>
                                           </p:stCondLst>
@@ -33508,8 +35210,8 @@
           </a:p>
         </p:txBody>
       </p:sp>
-      <mc:AlternateContent xmlns:mc="http://schemas.openxmlformats.org/markup-compatibility/2006" xmlns:a14="http://schemas.microsoft.com/office/drawing/2010/main">
-        <mc:Choice Requires="a14">
+      <mc:AlternateContent xmlns:mc="http://schemas.openxmlformats.org/markup-compatibility/2006">
+        <mc:Choice xmlns:a14="http://schemas.microsoft.com/office/drawing/2010/main" Requires="a14">
           <p:sp>
             <p:nvSpPr>
               <p:cNvPr id="3" name="Content Placeholder 2"/>
@@ -33591,7 +35293,7 @@
                           <a:rPr lang="en-US" b="0" i="1" smtClean="0">
                             <a:latin typeface="Cambria Math" panose="02040503050406030204" pitchFamily="18" charset="0"/>
                           </a:rPr>
-                          <m:t>𝑝</m:t>
+                          <m:t>𝑁</m:t>
                         </m:r>
                       </m:e>
                     </m:rad>
@@ -33628,7 +35330,7 @@
             </p:txBody>
           </p:sp>
         </mc:Choice>
-        <mc:Fallback xmlns="">
+        <mc:Fallback>
           <p:sp>
             <p:nvSpPr>
               <p:cNvPr id="3" name="Content Placeholder 2"/>
@@ -33865,6 +35567,40 @@
               </a:rPr>
               <a:t>Manifold learning  </a:t>
             </a:r>
+          </a:p>
+          <a:p>
+            <a:r>
+              <a:rPr lang="en-US" dirty="0">
+                <a:latin typeface="+mn-lt"/>
+              </a:rPr>
+              <a:t>Variational autoencoders (VAE) – beyond the scope of this course  </a:t>
+            </a:r>
+          </a:p>
+          <a:p>
+            <a:pPr lvl="1"/>
+            <a:r>
+              <a:rPr lang="en-US" dirty="0">
+                <a:latin typeface="+mn-lt"/>
+              </a:rPr>
+              <a:t>For introduction to VAEs, see </a:t>
+            </a:r>
+            <a:r>
+              <a:rPr lang="en-US" dirty="0" err="1">
+                <a:latin typeface="+mn-lt"/>
+                <a:hlinkClick r:id="rId3"/>
+              </a:rPr>
+              <a:t>Kingma</a:t>
+            </a:r>
+            <a:r>
+              <a:rPr lang="en-US" dirty="0">
+                <a:latin typeface="+mn-lt"/>
+                <a:hlinkClick r:id="rId3"/>
+              </a:rPr>
+              <a:t> and Welling, 2019</a:t>
+            </a:r>
+            <a:endParaRPr lang="en-US" dirty="0">
+              <a:latin typeface="+mn-lt"/>
+            </a:endParaRPr>
           </a:p>
           <a:p>
             <a:pPr lvl="1"/>
@@ -34210,6 +35946,86 @@
                                           <p:spTgt spid="3">
                                             <p:txEl>
                                               <p:pRg st="8" end="8"/>
+                                            </p:txEl>
+                                          </p:spTgt>
+                                        </p:tgtEl>
+                                        <p:attrNameLst>
+                                          <p:attrName>style.visibility</p:attrName>
+                                        </p:attrNameLst>
+                                      </p:cBhvr>
+                                      <p:to>
+                                        <p:strVal val="visible"/>
+                                      </p:to>
+                                    </p:set>
+                                  </p:childTnLst>
+                                </p:cTn>
+                              </p:par>
+                            </p:childTnLst>
+                          </p:cTn>
+                        </p:par>
+                      </p:childTnLst>
+                    </p:cTn>
+                  </p:par>
+                  <p:par>
+                    <p:cTn id="29" fill="hold">
+                      <p:stCondLst>
+                        <p:cond delay="indefinite"/>
+                      </p:stCondLst>
+                      <p:childTnLst>
+                        <p:par>
+                          <p:cTn id="30" fill="hold">
+                            <p:stCondLst>
+                              <p:cond delay="0"/>
+                            </p:stCondLst>
+                            <p:childTnLst>
+                              <p:par>
+                                <p:cTn id="31" presetID="1" presetClass="entr" presetSubtype="0" fill="hold" nodeType="clickEffect">
+                                  <p:stCondLst>
+                                    <p:cond delay="0"/>
+                                  </p:stCondLst>
+                                  <p:childTnLst>
+                                    <p:set>
+                                      <p:cBhvr>
+                                        <p:cTn id="32" dur="1" fill="hold">
+                                          <p:stCondLst>
+                                            <p:cond delay="0"/>
+                                          </p:stCondLst>
+                                        </p:cTn>
+                                        <p:tgtEl>
+                                          <p:spTgt spid="3">
+                                            <p:txEl>
+                                              <p:pRg st="9" end="9"/>
+                                            </p:txEl>
+                                          </p:spTgt>
+                                        </p:tgtEl>
+                                        <p:attrNameLst>
+                                          <p:attrName>style.visibility</p:attrName>
+                                        </p:attrNameLst>
+                                      </p:cBhvr>
+                                      <p:to>
+                                        <p:strVal val="visible"/>
+                                      </p:to>
+                                    </p:set>
+                                  </p:childTnLst>
+                                </p:cTn>
+                              </p:par>
+                              <p:par>
+                                <p:cTn id="33" presetID="1" presetClass="entr" presetSubtype="0" fill="hold" nodeType="withEffect">
+                                  <p:stCondLst>
+                                    <p:cond delay="0"/>
+                                  </p:stCondLst>
+                                  <p:childTnLst>
+                                    <p:set>
+                                      <p:cBhvr>
+                                        <p:cTn id="34" dur="1" fill="hold">
+                                          <p:stCondLst>
+                                            <p:cond delay="0"/>
+                                          </p:stCondLst>
+                                        </p:cTn>
+                                        <p:tgtEl>
+                                          <p:spTgt spid="3">
+                                            <p:txEl>
+                                              <p:pRg st="10" end="10"/>
                                             </p:txEl>
                                           </p:spTgt>
                                         </p:tgtEl>

</xml_diff>

<commit_message>
Fixed typos from lecture
</commit_message>
<xml_diff>
--- a/slides/11_DimensionalityReduction_Part1.pptx
+++ b/slides/11_DimensionalityReduction_Part1.pptx
@@ -8660,8 +8660,8 @@
           </a:p>
         </p:txBody>
       </p:sp>
-      <mc:AlternateContent xmlns:mc="http://schemas.openxmlformats.org/markup-compatibility/2006">
-        <mc:Choice xmlns:a14="http://schemas.microsoft.com/office/drawing/2010/main" Requires="a14">
+      <mc:AlternateContent xmlns:mc="http://schemas.openxmlformats.org/markup-compatibility/2006" xmlns:a14="http://schemas.microsoft.com/office/drawing/2010/main">
+        <mc:Choice Requires="a14">
           <p:sp>
             <p:nvSpPr>
               <p:cNvPr id="3" name="Content Placeholder 2"/>
@@ -8869,7 +8869,7 @@
             </p:txBody>
           </p:sp>
         </mc:Choice>
-        <mc:Fallback>
+        <mc:Fallback xmlns="">
           <p:sp>
             <p:nvSpPr>
               <p:cNvPr id="3" name="Content Placeholder 2"/>
@@ -10469,8 +10469,8 @@
           </a:p>
         </p:txBody>
       </p:sp>
-      <mc:AlternateContent xmlns:mc="http://schemas.openxmlformats.org/markup-compatibility/2006">
-        <mc:Choice xmlns:a14="http://schemas.microsoft.com/office/drawing/2010/main" Requires="a14">
+      <mc:AlternateContent xmlns:mc="http://schemas.openxmlformats.org/markup-compatibility/2006" xmlns:a14="http://schemas.microsoft.com/office/drawing/2010/main">
+        <mc:Choice Requires="a14">
           <p:sp>
             <p:nvSpPr>
               <p:cNvPr id="3" name="Content Placeholder 2">
@@ -10870,7 +10870,7 @@
             </p:txBody>
           </p:sp>
         </mc:Choice>
-        <mc:Fallback>
+        <mc:Fallback xmlns="">
           <p:sp>
             <p:nvSpPr>
               <p:cNvPr id="3" name="Content Placeholder 2">
@@ -11305,8 +11305,8 @@
           </a:p>
         </p:txBody>
       </p:sp>
-      <mc:AlternateContent xmlns:mc="http://schemas.openxmlformats.org/markup-compatibility/2006">
-        <mc:Choice xmlns:a14="http://schemas.microsoft.com/office/drawing/2010/main" Requires="a14">
+      <mc:AlternateContent xmlns:mc="http://schemas.openxmlformats.org/markup-compatibility/2006" xmlns:a14="http://schemas.microsoft.com/office/drawing/2010/main">
+        <mc:Choice Requires="a14">
           <p:sp>
             <p:nvSpPr>
               <p:cNvPr id="3" name="Content Placeholder 2"/>
@@ -11485,7 +11485,7 @@
             </p:txBody>
           </p:sp>
         </mc:Choice>
-        <mc:Fallback>
+        <mc:Fallback xmlns="">
           <p:sp>
             <p:nvSpPr>
               <p:cNvPr id="3" name="Content Placeholder 2"/>
@@ -13105,8 +13105,8 @@
           </a:p>
         </p:txBody>
       </p:sp>
-      <mc:AlternateContent xmlns:mc="http://schemas.openxmlformats.org/markup-compatibility/2006">
-        <mc:Choice xmlns:a14="http://schemas.microsoft.com/office/drawing/2010/main" Requires="a14">
+      <mc:AlternateContent xmlns:mc="http://schemas.openxmlformats.org/markup-compatibility/2006" xmlns:a14="http://schemas.microsoft.com/office/drawing/2010/main">
+        <mc:Choice Requires="a14">
           <p:sp>
             <p:nvSpPr>
               <p:cNvPr id="3" name="Content Placeholder 2">
@@ -13340,7 +13340,7 @@
             </p:txBody>
           </p:sp>
         </mc:Choice>
-        <mc:Fallback>
+        <mc:Fallback xmlns="">
           <p:sp>
             <p:nvSpPr>
               <p:cNvPr id="3" name="Content Placeholder 2">
@@ -14169,31 +14169,7 @@
                   <a:rPr lang="en-US" dirty="0">
                     <a:cs typeface="Segoe UI" panose="020B0502040204020203" pitchFamily="34" charset="0"/>
                   </a:rPr>
-                  <a:t> is the projection to an </a:t>
-                </a:r>
-                <a:r>
-                  <a:rPr lang="en-US" dirty="0" err="1">
-                    <a:cs typeface="Segoe UI" panose="020B0502040204020203" pitchFamily="34" charset="0"/>
-                  </a:rPr>
-                  <a:t>orthongonal</a:t>
-                </a:r>
-                <a:r>
-                  <a:rPr lang="en-US" dirty="0">
-                    <a:cs typeface="Segoe UI" panose="020B0502040204020203" pitchFamily="34" charset="0"/>
-                  </a:rPr>
-                  <a:t> </a:t>
-                </a:r>
-                <a:r>
-                  <a:rPr lang="en-US" dirty="0" err="1">
-                    <a:cs typeface="Segoe UI" panose="020B0502040204020203" pitchFamily="34" charset="0"/>
-                  </a:rPr>
-                  <a:t>Euclideian</a:t>
-                </a:r>
-                <a:r>
-                  <a:rPr lang="en-US" dirty="0">
-                    <a:cs typeface="Segoe UI" panose="020B0502040204020203" pitchFamily="34" charset="0"/>
-                  </a:rPr>
-                  <a:t> space with </a:t>
+                  <a:t> is the projection to an orthogonal Euclidean space with </a:t>
                 </a:r>
                 <a:r>
                   <a:rPr lang="en-US" b="1" dirty="0">
@@ -15064,8 +15040,8 @@
           </a:p>
         </p:txBody>
       </p:sp>
-      <mc:AlternateContent xmlns:mc="http://schemas.openxmlformats.org/markup-compatibility/2006">
-        <mc:Choice xmlns:a14="http://schemas.microsoft.com/office/drawing/2010/main" Requires="a14">
+      <mc:AlternateContent xmlns:mc="http://schemas.openxmlformats.org/markup-compatibility/2006" xmlns:a14="http://schemas.microsoft.com/office/drawing/2010/main">
+        <mc:Choice Requires="a14">
           <p:sp>
             <p:nvSpPr>
               <p:cNvPr id="3" name="Content Placeholder 2"/>
@@ -15570,7 +15546,7 @@
             </p:txBody>
           </p:sp>
         </mc:Choice>
-        <mc:Fallback>
+        <mc:Fallback xmlns="">
           <p:sp>
             <p:nvSpPr>
               <p:cNvPr id="3" name="Content Placeholder 2"/>
@@ -17368,8 +17344,8 @@
           </a:p>
         </p:txBody>
       </p:sp>
-      <mc:AlternateContent xmlns:mc="http://schemas.openxmlformats.org/markup-compatibility/2006">
-        <mc:Choice xmlns:a14="http://schemas.microsoft.com/office/drawing/2010/main" Requires="a14">
+      <mc:AlternateContent xmlns:mc="http://schemas.openxmlformats.org/markup-compatibility/2006" xmlns:a14="http://schemas.microsoft.com/office/drawing/2010/main">
+        <mc:Choice Requires="a14">
           <p:sp>
             <p:nvSpPr>
               <p:cNvPr id="3" name="Content Placeholder 2">
@@ -18048,7 +18024,7 @@
             </p:txBody>
           </p:sp>
         </mc:Choice>
-        <mc:Fallback>
+        <mc:Fallback xmlns="">
           <p:sp>
             <p:nvSpPr>
               <p:cNvPr id="3" name="Content Placeholder 2">
@@ -19143,8 +19119,8 @@
           </a:p>
         </p:txBody>
       </p:sp>
-      <mc:AlternateContent xmlns:mc="http://schemas.openxmlformats.org/markup-compatibility/2006">
-        <mc:Choice xmlns:a14="http://schemas.microsoft.com/office/drawing/2010/main" Requires="a14">
+      <mc:AlternateContent xmlns:mc="http://schemas.openxmlformats.org/markup-compatibility/2006" xmlns:a14="http://schemas.microsoft.com/office/drawing/2010/main">
+        <mc:Choice Requires="a14">
           <p:sp>
             <p:nvSpPr>
               <p:cNvPr id="3" name="Content Placeholder 2">
@@ -19958,7 +19934,7 @@
             </p:txBody>
           </p:sp>
         </mc:Choice>
-        <mc:Fallback>
+        <mc:Fallback xmlns="">
           <p:sp>
             <p:nvSpPr>
               <p:cNvPr id="3" name="Content Placeholder 2">
@@ -29205,8 +29181,8 @@
           </a:p>
         </p:txBody>
       </p:sp>
-      <mc:AlternateContent xmlns:mc="http://schemas.openxmlformats.org/markup-compatibility/2006">
-        <mc:Choice xmlns:a14="http://schemas.microsoft.com/office/drawing/2010/main" Requires="a14">
+      <mc:AlternateContent xmlns:mc="http://schemas.openxmlformats.org/markup-compatibility/2006" xmlns:a14="http://schemas.microsoft.com/office/drawing/2010/main">
+        <mc:Choice Requires="a14">
           <p:sp>
             <p:nvSpPr>
               <p:cNvPr id="3" name="Content Placeholder 2"/>
@@ -29853,7 +29829,7 @@
             </p:txBody>
           </p:sp>
         </mc:Choice>
-        <mc:Fallback>
+        <mc:Fallback xmlns="">
           <p:sp>
             <p:nvSpPr>
               <p:cNvPr id="3" name="Content Placeholder 2"/>
@@ -31963,8 +31939,8 @@
           </a:p>
         </p:txBody>
       </p:sp>
-      <mc:AlternateContent xmlns:mc="http://schemas.openxmlformats.org/markup-compatibility/2006">
-        <mc:Choice xmlns:a14="http://schemas.microsoft.com/office/drawing/2010/main" Requires="a14">
+      <mc:AlternateContent xmlns:mc="http://schemas.openxmlformats.org/markup-compatibility/2006" xmlns:a14="http://schemas.microsoft.com/office/drawing/2010/main">
+        <mc:Choice Requires="a14">
           <p:sp>
             <p:nvSpPr>
               <p:cNvPr id="3" name="Content Placeholder 2"/>
@@ -32542,7 +32518,7 @@
             </p:txBody>
           </p:sp>
         </mc:Choice>
-        <mc:Fallback>
+        <mc:Fallback xmlns="">
           <p:sp>
             <p:nvSpPr>
               <p:cNvPr id="3" name="Content Placeholder 2"/>
@@ -34174,8 +34150,8 @@
           </a:p>
         </p:txBody>
       </p:sp>
-      <mc:AlternateContent xmlns:mc="http://schemas.openxmlformats.org/markup-compatibility/2006">
-        <mc:Choice xmlns:a14="http://schemas.microsoft.com/office/drawing/2010/main" Requires="a14">
+      <mc:AlternateContent xmlns:mc="http://schemas.openxmlformats.org/markup-compatibility/2006" xmlns:a14="http://schemas.microsoft.com/office/drawing/2010/main">
+        <mc:Choice Requires="a14">
           <p:sp>
             <p:nvSpPr>
               <p:cNvPr id="3" name="Content Placeholder 2"/>
@@ -34757,7 +34733,7 @@
             </p:txBody>
           </p:sp>
         </mc:Choice>
-        <mc:Fallback>
+        <mc:Fallback xmlns="">
           <p:sp>
             <p:nvSpPr>
               <p:cNvPr id="3" name="Content Placeholder 2"/>
@@ -35210,8 +35186,8 @@
           </a:p>
         </p:txBody>
       </p:sp>
-      <mc:AlternateContent xmlns:mc="http://schemas.openxmlformats.org/markup-compatibility/2006">
-        <mc:Choice xmlns:a14="http://schemas.microsoft.com/office/drawing/2010/main" Requires="a14">
+      <mc:AlternateContent xmlns:mc="http://schemas.openxmlformats.org/markup-compatibility/2006" xmlns:a14="http://schemas.microsoft.com/office/drawing/2010/main">
+        <mc:Choice Requires="a14">
           <p:sp>
             <p:nvSpPr>
               <p:cNvPr id="3" name="Content Placeholder 2"/>
@@ -35330,7 +35306,7 @@
             </p:txBody>
           </p:sp>
         </mc:Choice>
-        <mc:Fallback>
+        <mc:Fallback xmlns="">
           <p:sp>
             <p:nvSpPr>
               <p:cNvPr id="3" name="Content Placeholder 2"/>

</xml_diff>